<commit_message>
Add repeated measures lab
</commit_message>
<xml_diff>
--- a/docs/articles/lectures/15_split-plot/figs/factorial.pptx
+++ b/docs/articles/lectures/15_split-plot/figs/factorial.pptx
@@ -4111,7 +4111,7 @@
         </p:nvSpPr>
         <p:spPr>
           <a:xfrm>
-            <a:off x="3808209" y="1602889"/>
+            <a:off x="3808209" y="441912"/>
             <a:ext cx="4582757" cy="4765638"/>
           </a:xfrm>
           <a:prstGeom prst="rect">
@@ -4167,7 +4167,7 @@
         </p:nvCxnSpPr>
         <p:spPr>
           <a:xfrm>
-            <a:off x="3808209" y="3985708"/>
+            <a:off x="3808209" y="2824731"/>
             <a:ext cx="4582757" cy="0"/>
           </a:xfrm>
           <a:prstGeom prst="line">
@@ -4210,7 +4210,7 @@
         </p:nvCxnSpPr>
         <p:spPr>
           <a:xfrm>
-            <a:off x="3808209" y="5138570"/>
+            <a:off x="3808209" y="3977593"/>
             <a:ext cx="4582757" cy="0"/>
           </a:xfrm>
           <a:prstGeom prst="line">
@@ -4253,7 +4253,7 @@
         </p:nvCxnSpPr>
         <p:spPr>
           <a:xfrm>
-            <a:off x="3804621" y="2827468"/>
+            <a:off x="3804621" y="1666491"/>
             <a:ext cx="4582757" cy="0"/>
           </a:xfrm>
           <a:prstGeom prst="line">
@@ -4294,7 +4294,7 @@
         </p:nvCxnSpPr>
         <p:spPr>
           <a:xfrm>
-            <a:off x="5314281" y="1602889"/>
+            <a:off x="5314281" y="441912"/>
             <a:ext cx="0" cy="4765638"/>
           </a:xfrm>
           <a:prstGeom prst="line">
@@ -4335,7 +4335,7 @@
         </p:nvCxnSpPr>
         <p:spPr>
           <a:xfrm>
-            <a:off x="6929716" y="1602889"/>
+            <a:off x="6929716" y="441912"/>
             <a:ext cx="0" cy="4765638"/>
           </a:xfrm>
           <a:prstGeom prst="line">
@@ -4376,7 +4376,7 @@
         </p:nvSpPr>
         <p:spPr>
           <a:xfrm>
-            <a:off x="5796309" y="1688973"/>
+            <a:off x="5796309" y="527996"/>
             <a:ext cx="705834" cy="369332"/>
           </a:xfrm>
           <a:prstGeom prst="rect">
@@ -4411,7 +4411,7 @@
         </p:nvSpPr>
         <p:spPr>
           <a:xfrm>
-            <a:off x="4235555" y="1694351"/>
+            <a:off x="4235555" y="533374"/>
             <a:ext cx="705834" cy="369332"/>
           </a:xfrm>
           <a:prstGeom prst="rect">
@@ -4446,7 +4446,7 @@
         </p:nvSpPr>
         <p:spPr>
           <a:xfrm>
-            <a:off x="7332857" y="1694351"/>
+            <a:off x="7332857" y="533374"/>
             <a:ext cx="705834" cy="369332"/>
           </a:xfrm>
           <a:prstGeom prst="rect">
@@ -4481,7 +4481,7 @@
         </p:nvSpPr>
         <p:spPr>
           <a:xfrm>
-            <a:off x="5796309" y="2827468"/>
+            <a:off x="5796309" y="1666491"/>
             <a:ext cx="705834" cy="369332"/>
           </a:xfrm>
           <a:prstGeom prst="rect">
@@ -4516,7 +4516,7 @@
         </p:nvSpPr>
         <p:spPr>
           <a:xfrm>
-            <a:off x="4235555" y="2832846"/>
+            <a:off x="4235555" y="1671869"/>
             <a:ext cx="705834" cy="369332"/>
           </a:xfrm>
           <a:prstGeom prst="rect">
@@ -4551,7 +4551,7 @@
         </p:nvSpPr>
         <p:spPr>
           <a:xfrm>
-            <a:off x="7332857" y="2832846"/>
+            <a:off x="7332857" y="1671869"/>
             <a:ext cx="705834" cy="369332"/>
           </a:xfrm>
           <a:prstGeom prst="rect">
@@ -4586,7 +4586,7 @@
         </p:nvSpPr>
         <p:spPr>
           <a:xfrm>
-            <a:off x="5796309" y="4000074"/>
+            <a:off x="5796309" y="2839097"/>
             <a:ext cx="705834" cy="369332"/>
           </a:xfrm>
           <a:prstGeom prst="rect">
@@ -4621,7 +4621,7 @@
         </p:nvSpPr>
         <p:spPr>
           <a:xfrm>
-            <a:off x="4235555" y="4005452"/>
+            <a:off x="4235555" y="2844475"/>
             <a:ext cx="705834" cy="369332"/>
           </a:xfrm>
           <a:prstGeom prst="rect">
@@ -4656,7 +4656,7 @@
         </p:nvSpPr>
         <p:spPr>
           <a:xfrm>
-            <a:off x="7332857" y="4005452"/>
+            <a:off x="7332857" y="2844475"/>
             <a:ext cx="705834" cy="369332"/>
           </a:xfrm>
           <a:prstGeom prst="rect">
@@ -4691,7 +4691,7 @@
         </p:nvSpPr>
         <p:spPr>
           <a:xfrm>
-            <a:off x="5796309" y="5152935"/>
+            <a:off x="5796309" y="3991958"/>
             <a:ext cx="705834" cy="369332"/>
           </a:xfrm>
           <a:prstGeom prst="rect">
@@ -4726,7 +4726,7 @@
         </p:nvSpPr>
         <p:spPr>
           <a:xfrm>
-            <a:off x="4235555" y="5158313"/>
+            <a:off x="4235555" y="3997336"/>
             <a:ext cx="705834" cy="369332"/>
           </a:xfrm>
           <a:prstGeom prst="rect">
@@ -4761,7 +4761,7 @@
         </p:nvSpPr>
         <p:spPr>
           <a:xfrm>
-            <a:off x="7332857" y="5158313"/>
+            <a:off x="7332857" y="3997336"/>
             <a:ext cx="705834" cy="369332"/>
           </a:xfrm>
           <a:prstGeom prst="rect">
@@ -4796,7 +4796,7 @@
         </p:nvCxnSpPr>
         <p:spPr>
           <a:xfrm>
-            <a:off x="4293705" y="1614566"/>
+            <a:off x="4293705" y="453589"/>
             <a:ext cx="0" cy="4771015"/>
           </a:xfrm>
           <a:prstGeom prst="line">
@@ -4837,7 +4837,7 @@
         </p:nvCxnSpPr>
         <p:spPr>
           <a:xfrm>
-            <a:off x="4803913" y="1597512"/>
+            <a:off x="4803913" y="436535"/>
             <a:ext cx="0" cy="4771015"/>
           </a:xfrm>
           <a:prstGeom prst="line">
@@ -4878,7 +4878,7 @@
         </p:nvCxnSpPr>
         <p:spPr>
           <a:xfrm>
-            <a:off x="5857462" y="1608845"/>
+            <a:off x="5857462" y="447868"/>
             <a:ext cx="0" cy="4771015"/>
           </a:xfrm>
           <a:prstGeom prst="line">
@@ -4919,7 +4919,7 @@
         </p:nvCxnSpPr>
         <p:spPr>
           <a:xfrm>
-            <a:off x="6367670" y="1591791"/>
+            <a:off x="6367670" y="430814"/>
             <a:ext cx="0" cy="4771015"/>
           </a:xfrm>
           <a:prstGeom prst="line">
@@ -4960,7 +4960,7 @@
         </p:nvCxnSpPr>
         <p:spPr>
           <a:xfrm>
-            <a:off x="7411279" y="1619943"/>
+            <a:off x="7411279" y="458966"/>
             <a:ext cx="0" cy="4771015"/>
           </a:xfrm>
           <a:prstGeom prst="line">
@@ -5001,7 +5001,7 @@
         </p:nvCxnSpPr>
         <p:spPr>
           <a:xfrm>
-            <a:off x="7921487" y="1602889"/>
+            <a:off x="7921487" y="441912"/>
             <a:ext cx="0" cy="4771015"/>
           </a:xfrm>
           <a:prstGeom prst="line">
@@ -5042,7 +5042,7 @@
         </p:nvSpPr>
         <p:spPr>
           <a:xfrm>
-            <a:off x="3801095" y="2486226"/>
+            <a:off x="3801095" y="1325249"/>
             <a:ext cx="293670" cy="338554"/>
           </a:xfrm>
           <a:prstGeom prst="rect">
@@ -5077,7 +5077,7 @@
         </p:nvSpPr>
         <p:spPr>
           <a:xfrm>
-            <a:off x="4273735" y="2488914"/>
+            <a:off x="4273735" y="1327937"/>
             <a:ext cx="303288" cy="338554"/>
           </a:xfrm>
           <a:prstGeom prst="rect">
@@ -5112,7 +5112,7 @@
         </p:nvSpPr>
         <p:spPr>
           <a:xfrm>
-            <a:off x="4773902" y="2491603"/>
+            <a:off x="4773902" y="1330626"/>
             <a:ext cx="296876" cy="338554"/>
           </a:xfrm>
           <a:prstGeom prst="rect">
@@ -5147,7 +5147,7 @@
         </p:nvSpPr>
         <p:spPr>
           <a:xfrm>
-            <a:off x="5348288" y="2499726"/>
+            <a:off x="5348288" y="1338749"/>
             <a:ext cx="303288" cy="338554"/>
           </a:xfrm>
           <a:prstGeom prst="rect">
@@ -5182,7 +5182,7 @@
         </p:nvSpPr>
         <p:spPr>
           <a:xfrm>
-            <a:off x="5820928" y="2502414"/>
+            <a:off x="5820928" y="1341437"/>
             <a:ext cx="296876" cy="338554"/>
           </a:xfrm>
           <a:prstGeom prst="rect">
@@ -5217,7 +5217,7 @@
         </p:nvSpPr>
         <p:spPr>
           <a:xfrm>
-            <a:off x="6350912" y="2505103"/>
+            <a:off x="6350912" y="1344126"/>
             <a:ext cx="293670" cy="338554"/>
           </a:xfrm>
           <a:prstGeom prst="rect">
@@ -5252,7 +5252,7 @@
         </p:nvSpPr>
         <p:spPr>
           <a:xfrm>
-            <a:off x="6893607" y="2498792"/>
+            <a:off x="6893607" y="1337815"/>
             <a:ext cx="293670" cy="338554"/>
           </a:xfrm>
           <a:prstGeom prst="rect">
@@ -5287,7 +5287,7 @@
         </p:nvSpPr>
         <p:spPr>
           <a:xfrm>
-            <a:off x="7366247" y="2501480"/>
+            <a:off x="7366247" y="1340503"/>
             <a:ext cx="296876" cy="338554"/>
           </a:xfrm>
           <a:prstGeom prst="rect">
@@ -5322,7 +5322,7 @@
         </p:nvSpPr>
         <p:spPr>
           <a:xfrm>
-            <a:off x="7866414" y="2504169"/>
+            <a:off x="7866414" y="1343192"/>
             <a:ext cx="303288" cy="338554"/>
           </a:xfrm>
           <a:prstGeom prst="rect">
@@ -5357,7 +5357,7 @@
         </p:nvSpPr>
         <p:spPr>
           <a:xfrm>
-            <a:off x="3801095" y="3644626"/>
+            <a:off x="3801095" y="2483649"/>
             <a:ext cx="303288" cy="338554"/>
           </a:xfrm>
           <a:prstGeom prst="rect">
@@ -5392,7 +5392,7 @@
         </p:nvSpPr>
         <p:spPr>
           <a:xfrm>
-            <a:off x="4273735" y="3647314"/>
+            <a:off x="4273735" y="2486337"/>
             <a:ext cx="293670" cy="338554"/>
           </a:xfrm>
           <a:prstGeom prst="rect">
@@ -5427,7 +5427,7 @@
         </p:nvSpPr>
         <p:spPr>
           <a:xfrm>
-            <a:off x="4773902" y="3650003"/>
+            <a:off x="4773902" y="2489026"/>
             <a:ext cx="296876" cy="338554"/>
           </a:xfrm>
           <a:prstGeom prst="rect">
@@ -5462,7 +5462,7 @@
         </p:nvSpPr>
         <p:spPr>
           <a:xfrm>
-            <a:off x="5348288" y="3658126"/>
+            <a:off x="5348288" y="2497149"/>
             <a:ext cx="293670" cy="338554"/>
           </a:xfrm>
           <a:prstGeom prst="rect">
@@ -5497,7 +5497,7 @@
         </p:nvSpPr>
         <p:spPr>
           <a:xfrm>
-            <a:off x="5820928" y="3660814"/>
+            <a:off x="5820928" y="2499837"/>
             <a:ext cx="303288" cy="338554"/>
           </a:xfrm>
           <a:prstGeom prst="rect">
@@ -5532,7 +5532,7 @@
         </p:nvSpPr>
         <p:spPr>
           <a:xfrm>
-            <a:off x="6350912" y="3663503"/>
+            <a:off x="6350912" y="2502526"/>
             <a:ext cx="296876" cy="338554"/>
           </a:xfrm>
           <a:prstGeom prst="rect">
@@ -5567,7 +5567,7 @@
         </p:nvSpPr>
         <p:spPr>
           <a:xfrm>
-            <a:off x="6893607" y="3657192"/>
+            <a:off x="6893607" y="2496215"/>
             <a:ext cx="296876" cy="338554"/>
           </a:xfrm>
           <a:prstGeom prst="rect">
@@ -5602,7 +5602,7 @@
         </p:nvSpPr>
         <p:spPr>
           <a:xfrm>
-            <a:off x="7366247" y="3659880"/>
+            <a:off x="7366247" y="2498903"/>
             <a:ext cx="293670" cy="338554"/>
           </a:xfrm>
           <a:prstGeom prst="rect">
@@ -5637,7 +5637,7 @@
         </p:nvSpPr>
         <p:spPr>
           <a:xfrm>
-            <a:off x="7866414" y="3662569"/>
+            <a:off x="7866414" y="2501592"/>
             <a:ext cx="303288" cy="338554"/>
           </a:xfrm>
           <a:prstGeom prst="rect">
@@ -5672,7 +5672,7 @@
         </p:nvSpPr>
         <p:spPr>
           <a:xfrm>
-            <a:off x="3801095" y="4780318"/>
+            <a:off x="3801095" y="3619341"/>
             <a:ext cx="296876" cy="338554"/>
           </a:xfrm>
           <a:prstGeom prst="rect">
@@ -5707,7 +5707,7 @@
         </p:nvSpPr>
         <p:spPr>
           <a:xfrm>
-            <a:off x="4273735" y="4783006"/>
+            <a:off x="4273735" y="3622029"/>
             <a:ext cx="293670" cy="338554"/>
           </a:xfrm>
           <a:prstGeom prst="rect">
@@ -5742,7 +5742,7 @@
         </p:nvSpPr>
         <p:spPr>
           <a:xfrm>
-            <a:off x="4773902" y="4785695"/>
+            <a:off x="4773902" y="3624718"/>
             <a:ext cx="303288" cy="338554"/>
           </a:xfrm>
           <a:prstGeom prst="rect">
@@ -5777,7 +5777,7 @@
         </p:nvSpPr>
         <p:spPr>
           <a:xfrm>
-            <a:off x="5348288" y="4793818"/>
+            <a:off x="5348288" y="3632841"/>
             <a:ext cx="303288" cy="338554"/>
           </a:xfrm>
           <a:prstGeom prst="rect">
@@ -5812,7 +5812,7 @@
         </p:nvSpPr>
         <p:spPr>
           <a:xfrm>
-            <a:off x="5820928" y="4796506"/>
+            <a:off x="5820928" y="3635529"/>
             <a:ext cx="296876" cy="338554"/>
           </a:xfrm>
           <a:prstGeom prst="rect">
@@ -5847,7 +5847,7 @@
         </p:nvSpPr>
         <p:spPr>
           <a:xfrm>
-            <a:off x="6350912" y="4799195"/>
+            <a:off x="6350912" y="3638218"/>
             <a:ext cx="293670" cy="338554"/>
           </a:xfrm>
           <a:prstGeom prst="rect">
@@ -5882,7 +5882,7 @@
         </p:nvSpPr>
         <p:spPr>
           <a:xfrm>
-            <a:off x="6893607" y="4792884"/>
+            <a:off x="6893607" y="3631907"/>
             <a:ext cx="296876" cy="338554"/>
           </a:xfrm>
           <a:prstGeom prst="rect">
@@ -5917,7 +5917,7 @@
         </p:nvSpPr>
         <p:spPr>
           <a:xfrm>
-            <a:off x="7366247" y="4795572"/>
+            <a:off x="7366247" y="3634595"/>
             <a:ext cx="293670" cy="338554"/>
           </a:xfrm>
           <a:prstGeom prst="rect">
@@ -5952,7 +5952,7 @@
         </p:nvSpPr>
         <p:spPr>
           <a:xfrm>
-            <a:off x="7866414" y="4798261"/>
+            <a:off x="7866414" y="3637284"/>
             <a:ext cx="303288" cy="338554"/>
           </a:xfrm>
           <a:prstGeom prst="rect">
@@ -5987,7 +5987,7 @@
         </p:nvSpPr>
         <p:spPr>
           <a:xfrm>
-            <a:off x="3807282" y="5996871"/>
+            <a:off x="3807282" y="4835894"/>
             <a:ext cx="303288" cy="338554"/>
           </a:xfrm>
           <a:prstGeom prst="rect">
@@ -6022,7 +6022,7 @@
         </p:nvSpPr>
         <p:spPr>
           <a:xfrm>
-            <a:off x="4279922" y="5999559"/>
+            <a:off x="4279922" y="4838582"/>
             <a:ext cx="293670" cy="338554"/>
           </a:xfrm>
           <a:prstGeom prst="rect">
@@ -6057,7 +6057,7 @@
         </p:nvSpPr>
         <p:spPr>
           <a:xfrm>
-            <a:off x="4780089" y="6002248"/>
+            <a:off x="4780089" y="4841271"/>
             <a:ext cx="296876" cy="338554"/>
           </a:xfrm>
           <a:prstGeom prst="rect">
@@ -6092,7 +6092,7 @@
         </p:nvSpPr>
         <p:spPr>
           <a:xfrm>
-            <a:off x="5354475" y="6010371"/>
+            <a:off x="5354475" y="4849394"/>
             <a:ext cx="303288" cy="338554"/>
           </a:xfrm>
           <a:prstGeom prst="rect">
@@ -6127,7 +6127,7 @@
         </p:nvSpPr>
         <p:spPr>
           <a:xfrm>
-            <a:off x="5827115" y="6013059"/>
+            <a:off x="5827115" y="4852082"/>
             <a:ext cx="296876" cy="338554"/>
           </a:xfrm>
           <a:prstGeom prst="rect">
@@ -6162,7 +6162,7 @@
         </p:nvSpPr>
         <p:spPr>
           <a:xfrm>
-            <a:off x="6357099" y="6015748"/>
+            <a:off x="6357099" y="4854771"/>
             <a:ext cx="293670" cy="338554"/>
           </a:xfrm>
           <a:prstGeom prst="rect">
@@ -6197,7 +6197,7 @@
         </p:nvSpPr>
         <p:spPr>
           <a:xfrm>
-            <a:off x="6899794" y="6009437"/>
+            <a:off x="6899794" y="4848460"/>
             <a:ext cx="293670" cy="338554"/>
           </a:xfrm>
           <a:prstGeom prst="rect">
@@ -6232,7 +6232,7 @@
         </p:nvSpPr>
         <p:spPr>
           <a:xfrm>
-            <a:off x="7372434" y="6012125"/>
+            <a:off x="7372434" y="4851148"/>
             <a:ext cx="303288" cy="338554"/>
           </a:xfrm>
           <a:prstGeom prst="rect">
@@ -6267,7 +6267,7 @@
         </p:nvSpPr>
         <p:spPr>
           <a:xfrm>
-            <a:off x="7872601" y="6014814"/>
+            <a:off x="7872601" y="4853837"/>
             <a:ext cx="296876" cy="338554"/>
           </a:xfrm>
           <a:prstGeom prst="rect">
@@ -6302,7 +6302,7 @@
         </p:nvSpPr>
         <p:spPr>
           <a:xfrm>
-            <a:off x="2521928" y="2047462"/>
+            <a:off x="2521928" y="886485"/>
             <a:ext cx="996555" cy="369332"/>
           </a:xfrm>
           <a:prstGeom prst="rect">
@@ -6337,7 +6337,7 @@
         </p:nvSpPr>
         <p:spPr>
           <a:xfrm>
-            <a:off x="2521927" y="3244334"/>
+            <a:off x="2521927" y="2083357"/>
             <a:ext cx="996555" cy="369332"/>
           </a:xfrm>
           <a:prstGeom prst="rect">
@@ -6372,7 +6372,7 @@
         </p:nvSpPr>
         <p:spPr>
           <a:xfrm>
-            <a:off x="2521926" y="4441206"/>
+            <a:off x="2521926" y="3280229"/>
             <a:ext cx="996555" cy="369332"/>
           </a:xfrm>
           <a:prstGeom prst="rect">
@@ -6407,7 +6407,7 @@
         </p:nvSpPr>
         <p:spPr>
           <a:xfrm>
-            <a:off x="2521926" y="5638078"/>
+            <a:off x="2521926" y="4477101"/>
             <a:ext cx="996555" cy="369332"/>
           </a:xfrm>
           <a:prstGeom prst="rect">
@@ -6442,7 +6442,7 @@
         </p:nvSpPr>
         <p:spPr>
           <a:xfrm>
-            <a:off x="2097157" y="1769165"/>
+            <a:off x="2097157" y="608188"/>
             <a:ext cx="447260" cy="4403035"/>
           </a:xfrm>
           <a:prstGeom prst="leftBrace">
@@ -6491,7 +6491,7 @@
         </p:nvSpPr>
         <p:spPr>
           <a:xfrm>
-            <a:off x="1083268" y="3766138"/>
+            <a:off x="1083268" y="2605161"/>
             <a:ext cx="1072217" cy="369332"/>
           </a:xfrm>
           <a:prstGeom prst="rect">
@@ -6578,7 +6578,7 @@
         </p:nvSpPr>
         <p:spPr>
           <a:xfrm>
-            <a:off x="3808209" y="1602889"/>
+            <a:off x="3808209" y="452188"/>
             <a:ext cx="4582757" cy="4765638"/>
           </a:xfrm>
           <a:prstGeom prst="rect">
@@ -6634,7 +6634,7 @@
         </p:nvCxnSpPr>
         <p:spPr>
           <a:xfrm>
-            <a:off x="3808209" y="3985708"/>
+            <a:off x="3808209" y="2835007"/>
             <a:ext cx="4582757" cy="0"/>
           </a:xfrm>
           <a:prstGeom prst="line">
@@ -6677,7 +6677,7 @@
         </p:nvCxnSpPr>
         <p:spPr>
           <a:xfrm>
-            <a:off x="3808209" y="5138570"/>
+            <a:off x="3808209" y="3987869"/>
             <a:ext cx="4582757" cy="0"/>
           </a:xfrm>
           <a:prstGeom prst="line">
@@ -6720,7 +6720,7 @@
         </p:nvCxnSpPr>
         <p:spPr>
           <a:xfrm>
-            <a:off x="3804621" y="2827468"/>
+            <a:off x="3804621" y="1676767"/>
             <a:ext cx="4582757" cy="0"/>
           </a:xfrm>
           <a:prstGeom prst="line">
@@ -6761,7 +6761,7 @@
         </p:nvCxnSpPr>
         <p:spPr>
           <a:xfrm>
-            <a:off x="5314281" y="1602889"/>
+            <a:off x="5314281" y="452188"/>
             <a:ext cx="0" cy="4765638"/>
           </a:xfrm>
           <a:prstGeom prst="line">
@@ -6802,7 +6802,7 @@
         </p:nvCxnSpPr>
         <p:spPr>
           <a:xfrm>
-            <a:off x="6929716" y="1602889"/>
+            <a:off x="6929716" y="452188"/>
             <a:ext cx="0" cy="4765638"/>
           </a:xfrm>
           <a:prstGeom prst="line">
@@ -6843,7 +6843,7 @@
         </p:nvSpPr>
         <p:spPr>
           <a:xfrm>
-            <a:off x="5783952" y="1688973"/>
+            <a:off x="5783952" y="538272"/>
             <a:ext cx="705834" cy="369332"/>
           </a:xfrm>
           <a:prstGeom prst="rect">
@@ -6878,7 +6878,7 @@
         </p:nvSpPr>
         <p:spPr>
           <a:xfrm>
-            <a:off x="4223198" y="1694351"/>
+            <a:off x="4223198" y="543650"/>
             <a:ext cx="705834" cy="369332"/>
           </a:xfrm>
           <a:prstGeom prst="rect">
@@ -6913,7 +6913,7 @@
         </p:nvSpPr>
         <p:spPr>
           <a:xfrm>
-            <a:off x="7320500" y="1694351"/>
+            <a:off x="7320500" y="543650"/>
             <a:ext cx="705834" cy="369332"/>
           </a:xfrm>
           <a:prstGeom prst="rect">
@@ -6948,7 +6948,7 @@
         </p:nvSpPr>
         <p:spPr>
           <a:xfrm>
-            <a:off x="5783952" y="2827468"/>
+            <a:off x="5783952" y="1676767"/>
             <a:ext cx="705834" cy="369332"/>
           </a:xfrm>
           <a:prstGeom prst="rect">
@@ -6983,7 +6983,7 @@
         </p:nvSpPr>
         <p:spPr>
           <a:xfrm>
-            <a:off x="4223198" y="2832846"/>
+            <a:off x="4223198" y="1682145"/>
             <a:ext cx="705834" cy="369332"/>
           </a:xfrm>
           <a:prstGeom prst="rect">
@@ -7018,7 +7018,7 @@
         </p:nvSpPr>
         <p:spPr>
           <a:xfrm>
-            <a:off x="7320500" y="2832846"/>
+            <a:off x="7320500" y="1682145"/>
             <a:ext cx="705834" cy="369332"/>
           </a:xfrm>
           <a:prstGeom prst="rect">
@@ -7053,7 +7053,7 @@
         </p:nvSpPr>
         <p:spPr>
           <a:xfrm>
-            <a:off x="5783952" y="4000074"/>
+            <a:off x="5783952" y="2849373"/>
             <a:ext cx="705834" cy="369332"/>
           </a:xfrm>
           <a:prstGeom prst="rect">
@@ -7088,7 +7088,7 @@
         </p:nvSpPr>
         <p:spPr>
           <a:xfrm>
-            <a:off x="4223198" y="4005452"/>
+            <a:off x="4223198" y="2854751"/>
             <a:ext cx="705834" cy="369332"/>
           </a:xfrm>
           <a:prstGeom prst="rect">
@@ -7123,7 +7123,7 @@
         </p:nvSpPr>
         <p:spPr>
           <a:xfrm>
-            <a:off x="7320500" y="4005452"/>
+            <a:off x="7320500" y="2854751"/>
             <a:ext cx="705834" cy="369332"/>
           </a:xfrm>
           <a:prstGeom prst="rect">
@@ -7158,7 +7158,7 @@
         </p:nvSpPr>
         <p:spPr>
           <a:xfrm>
-            <a:off x="5783952" y="5152935"/>
+            <a:off x="5783952" y="4002234"/>
             <a:ext cx="705834" cy="369332"/>
           </a:xfrm>
           <a:prstGeom prst="rect">
@@ -7193,7 +7193,7 @@
         </p:nvSpPr>
         <p:spPr>
           <a:xfrm>
-            <a:off x="4223198" y="5158313"/>
+            <a:off x="4223198" y="4007612"/>
             <a:ext cx="705834" cy="369332"/>
           </a:xfrm>
           <a:prstGeom prst="rect">
@@ -7228,7 +7228,7 @@
         </p:nvSpPr>
         <p:spPr>
           <a:xfrm>
-            <a:off x="7320500" y="5158313"/>
+            <a:off x="7320500" y="4007612"/>
             <a:ext cx="705834" cy="369332"/>
           </a:xfrm>
           <a:prstGeom prst="rect">
@@ -7263,7 +7263,7 @@
         </p:nvCxnSpPr>
         <p:spPr>
           <a:xfrm>
-            <a:off x="4293705" y="1614566"/>
+            <a:off x="4293705" y="463865"/>
             <a:ext cx="0" cy="4771015"/>
           </a:xfrm>
           <a:prstGeom prst="line">
@@ -7304,7 +7304,7 @@
         </p:nvCxnSpPr>
         <p:spPr>
           <a:xfrm>
-            <a:off x="4803913" y="1597512"/>
+            <a:off x="4803913" y="446811"/>
             <a:ext cx="0" cy="4771015"/>
           </a:xfrm>
           <a:prstGeom prst="line">
@@ -7345,7 +7345,7 @@
         </p:nvCxnSpPr>
         <p:spPr>
           <a:xfrm>
-            <a:off x="5857462" y="1608845"/>
+            <a:off x="5857462" y="458144"/>
             <a:ext cx="0" cy="4771015"/>
           </a:xfrm>
           <a:prstGeom prst="line">
@@ -7386,7 +7386,7 @@
         </p:nvCxnSpPr>
         <p:spPr>
           <a:xfrm>
-            <a:off x="6367670" y="1591791"/>
+            <a:off x="6367670" y="441090"/>
             <a:ext cx="0" cy="4771015"/>
           </a:xfrm>
           <a:prstGeom prst="line">
@@ -7427,7 +7427,7 @@
         </p:nvCxnSpPr>
         <p:spPr>
           <a:xfrm>
-            <a:off x="7411279" y="1619943"/>
+            <a:off x="7411279" y="469242"/>
             <a:ext cx="0" cy="4771015"/>
           </a:xfrm>
           <a:prstGeom prst="line">
@@ -7468,7 +7468,7 @@
         </p:nvCxnSpPr>
         <p:spPr>
           <a:xfrm>
-            <a:off x="7921487" y="1602889"/>
+            <a:off x="7921487" y="452188"/>
             <a:ext cx="0" cy="4771015"/>
           </a:xfrm>
           <a:prstGeom prst="line">
@@ -7509,7 +7509,7 @@
         </p:nvSpPr>
         <p:spPr>
           <a:xfrm>
-            <a:off x="3801095" y="2486226"/>
+            <a:off x="3801095" y="1335525"/>
             <a:ext cx="293670" cy="338554"/>
           </a:xfrm>
           <a:prstGeom prst="rect">
@@ -7544,7 +7544,7 @@
         </p:nvSpPr>
         <p:spPr>
           <a:xfrm>
-            <a:off x="4273735" y="2488914"/>
+            <a:off x="4273735" y="1338213"/>
             <a:ext cx="303288" cy="338554"/>
           </a:xfrm>
           <a:prstGeom prst="rect">
@@ -7579,7 +7579,7 @@
         </p:nvSpPr>
         <p:spPr>
           <a:xfrm>
-            <a:off x="4773902" y="2491603"/>
+            <a:off x="4773902" y="1340902"/>
             <a:ext cx="296876" cy="338554"/>
           </a:xfrm>
           <a:prstGeom prst="rect">
@@ -7614,7 +7614,7 @@
         </p:nvSpPr>
         <p:spPr>
           <a:xfrm>
-            <a:off x="5348288" y="2499726"/>
+            <a:off x="5348288" y="1349025"/>
             <a:ext cx="303288" cy="338554"/>
           </a:xfrm>
           <a:prstGeom prst="rect">
@@ -7649,7 +7649,7 @@
         </p:nvSpPr>
         <p:spPr>
           <a:xfrm>
-            <a:off x="5820928" y="2502414"/>
+            <a:off x="5820928" y="1351713"/>
             <a:ext cx="296876" cy="338554"/>
           </a:xfrm>
           <a:prstGeom prst="rect">
@@ -7684,7 +7684,7 @@
         </p:nvSpPr>
         <p:spPr>
           <a:xfrm>
-            <a:off x="6350912" y="2505103"/>
+            <a:off x="6350912" y="1354402"/>
             <a:ext cx="293670" cy="338554"/>
           </a:xfrm>
           <a:prstGeom prst="rect">
@@ -7719,7 +7719,7 @@
         </p:nvSpPr>
         <p:spPr>
           <a:xfrm>
-            <a:off x="6893607" y="2498792"/>
+            <a:off x="6893607" y="1348091"/>
             <a:ext cx="293670" cy="338554"/>
           </a:xfrm>
           <a:prstGeom prst="rect">
@@ -7754,7 +7754,7 @@
         </p:nvSpPr>
         <p:spPr>
           <a:xfrm>
-            <a:off x="7366247" y="2501480"/>
+            <a:off x="7366247" y="1350779"/>
             <a:ext cx="296876" cy="338554"/>
           </a:xfrm>
           <a:prstGeom prst="rect">
@@ -7789,7 +7789,7 @@
         </p:nvSpPr>
         <p:spPr>
           <a:xfrm>
-            <a:off x="7866414" y="2504169"/>
+            <a:off x="7866414" y="1353468"/>
             <a:ext cx="303288" cy="338554"/>
           </a:xfrm>
           <a:prstGeom prst="rect">
@@ -7824,7 +7824,7 @@
         </p:nvSpPr>
         <p:spPr>
           <a:xfrm>
-            <a:off x="3801095" y="3644626"/>
+            <a:off x="3801095" y="2493925"/>
             <a:ext cx="303288" cy="338554"/>
           </a:xfrm>
           <a:prstGeom prst="rect">
@@ -7859,7 +7859,7 @@
         </p:nvSpPr>
         <p:spPr>
           <a:xfrm>
-            <a:off x="4273735" y="3647314"/>
+            <a:off x="4273735" y="2496613"/>
             <a:ext cx="293670" cy="338554"/>
           </a:xfrm>
           <a:prstGeom prst="rect">
@@ -7894,7 +7894,7 @@
         </p:nvSpPr>
         <p:spPr>
           <a:xfrm>
-            <a:off x="4773902" y="3650003"/>
+            <a:off x="4773902" y="2499302"/>
             <a:ext cx="296876" cy="338554"/>
           </a:xfrm>
           <a:prstGeom prst="rect">
@@ -7929,7 +7929,7 @@
         </p:nvSpPr>
         <p:spPr>
           <a:xfrm>
-            <a:off x="5348288" y="3658126"/>
+            <a:off x="5348288" y="2507425"/>
             <a:ext cx="293670" cy="338554"/>
           </a:xfrm>
           <a:prstGeom prst="rect">
@@ -7964,7 +7964,7 @@
         </p:nvSpPr>
         <p:spPr>
           <a:xfrm>
-            <a:off x="5820928" y="3660814"/>
+            <a:off x="5820928" y="2510113"/>
             <a:ext cx="303288" cy="338554"/>
           </a:xfrm>
           <a:prstGeom prst="rect">
@@ -7999,7 +7999,7 @@
         </p:nvSpPr>
         <p:spPr>
           <a:xfrm>
-            <a:off x="6350912" y="3663503"/>
+            <a:off x="6350912" y="2512802"/>
             <a:ext cx="296876" cy="338554"/>
           </a:xfrm>
           <a:prstGeom prst="rect">
@@ -8034,7 +8034,7 @@
         </p:nvSpPr>
         <p:spPr>
           <a:xfrm>
-            <a:off x="6893607" y="3657192"/>
+            <a:off x="6893607" y="2506491"/>
             <a:ext cx="296876" cy="338554"/>
           </a:xfrm>
           <a:prstGeom prst="rect">
@@ -8069,7 +8069,7 @@
         </p:nvSpPr>
         <p:spPr>
           <a:xfrm>
-            <a:off x="7366247" y="3659880"/>
+            <a:off x="7366247" y="2509179"/>
             <a:ext cx="293670" cy="338554"/>
           </a:xfrm>
           <a:prstGeom prst="rect">
@@ -8104,7 +8104,7 @@
         </p:nvSpPr>
         <p:spPr>
           <a:xfrm>
-            <a:off x="7866414" y="3662569"/>
+            <a:off x="7866414" y="2511868"/>
             <a:ext cx="303288" cy="338554"/>
           </a:xfrm>
           <a:prstGeom prst="rect">
@@ -8139,7 +8139,7 @@
         </p:nvSpPr>
         <p:spPr>
           <a:xfrm>
-            <a:off x="3801095" y="4780318"/>
+            <a:off x="3801095" y="3629617"/>
             <a:ext cx="296876" cy="338554"/>
           </a:xfrm>
           <a:prstGeom prst="rect">
@@ -8174,7 +8174,7 @@
         </p:nvSpPr>
         <p:spPr>
           <a:xfrm>
-            <a:off x="4273735" y="4783006"/>
+            <a:off x="4273735" y="3632305"/>
             <a:ext cx="293670" cy="338554"/>
           </a:xfrm>
           <a:prstGeom prst="rect">
@@ -8209,7 +8209,7 @@
         </p:nvSpPr>
         <p:spPr>
           <a:xfrm>
-            <a:off x="4773902" y="4785695"/>
+            <a:off x="4773902" y="3634994"/>
             <a:ext cx="303288" cy="338554"/>
           </a:xfrm>
           <a:prstGeom prst="rect">
@@ -8244,7 +8244,7 @@
         </p:nvSpPr>
         <p:spPr>
           <a:xfrm>
-            <a:off x="5348288" y="4793818"/>
+            <a:off x="5348288" y="3643117"/>
             <a:ext cx="303288" cy="338554"/>
           </a:xfrm>
           <a:prstGeom prst="rect">
@@ -8279,7 +8279,7 @@
         </p:nvSpPr>
         <p:spPr>
           <a:xfrm>
-            <a:off x="5820928" y="4796506"/>
+            <a:off x="5820928" y="3645805"/>
             <a:ext cx="296876" cy="338554"/>
           </a:xfrm>
           <a:prstGeom prst="rect">
@@ -8314,7 +8314,7 @@
         </p:nvSpPr>
         <p:spPr>
           <a:xfrm>
-            <a:off x="6350912" y="4799195"/>
+            <a:off x="6350912" y="3648494"/>
             <a:ext cx="293670" cy="338554"/>
           </a:xfrm>
           <a:prstGeom prst="rect">
@@ -8349,7 +8349,7 @@
         </p:nvSpPr>
         <p:spPr>
           <a:xfrm>
-            <a:off x="6893607" y="4792884"/>
+            <a:off x="6893607" y="3642183"/>
             <a:ext cx="296876" cy="338554"/>
           </a:xfrm>
           <a:prstGeom prst="rect">
@@ -8384,7 +8384,7 @@
         </p:nvSpPr>
         <p:spPr>
           <a:xfrm>
-            <a:off x="7366247" y="4795572"/>
+            <a:off x="7366247" y="3644871"/>
             <a:ext cx="293670" cy="338554"/>
           </a:xfrm>
           <a:prstGeom prst="rect">
@@ -8419,7 +8419,7 @@
         </p:nvSpPr>
         <p:spPr>
           <a:xfrm>
-            <a:off x="7866414" y="4798261"/>
+            <a:off x="7866414" y="3647560"/>
             <a:ext cx="303288" cy="338554"/>
           </a:xfrm>
           <a:prstGeom prst="rect">
@@ -8454,7 +8454,7 @@
         </p:nvSpPr>
         <p:spPr>
           <a:xfrm>
-            <a:off x="3807282" y="5996871"/>
+            <a:off x="3807282" y="4846170"/>
             <a:ext cx="303288" cy="338554"/>
           </a:xfrm>
           <a:prstGeom prst="rect">
@@ -8489,7 +8489,7 @@
         </p:nvSpPr>
         <p:spPr>
           <a:xfrm>
-            <a:off x="4279922" y="5999559"/>
+            <a:off x="4279922" y="4848858"/>
             <a:ext cx="293670" cy="338554"/>
           </a:xfrm>
           <a:prstGeom prst="rect">
@@ -8524,7 +8524,7 @@
         </p:nvSpPr>
         <p:spPr>
           <a:xfrm>
-            <a:off x="4780089" y="6002248"/>
+            <a:off x="4780089" y="4851547"/>
             <a:ext cx="296876" cy="338554"/>
           </a:xfrm>
           <a:prstGeom prst="rect">
@@ -8559,7 +8559,7 @@
         </p:nvSpPr>
         <p:spPr>
           <a:xfrm>
-            <a:off x="5354475" y="6010371"/>
+            <a:off x="5354475" y="4859670"/>
             <a:ext cx="303288" cy="338554"/>
           </a:xfrm>
           <a:prstGeom prst="rect">
@@ -8594,7 +8594,7 @@
         </p:nvSpPr>
         <p:spPr>
           <a:xfrm>
-            <a:off x="5827115" y="6013059"/>
+            <a:off x="5827115" y="4862358"/>
             <a:ext cx="296876" cy="338554"/>
           </a:xfrm>
           <a:prstGeom prst="rect">
@@ -8629,7 +8629,7 @@
         </p:nvSpPr>
         <p:spPr>
           <a:xfrm>
-            <a:off x="6357099" y="6015748"/>
+            <a:off x="6357099" y="4865047"/>
             <a:ext cx="293670" cy="338554"/>
           </a:xfrm>
           <a:prstGeom prst="rect">
@@ -8664,7 +8664,7 @@
         </p:nvSpPr>
         <p:spPr>
           <a:xfrm>
-            <a:off x="6899794" y="6009437"/>
+            <a:off x="6899794" y="4858736"/>
             <a:ext cx="293670" cy="338554"/>
           </a:xfrm>
           <a:prstGeom prst="rect">
@@ -8699,7 +8699,7 @@
         </p:nvSpPr>
         <p:spPr>
           <a:xfrm>
-            <a:off x="7372434" y="6012125"/>
+            <a:off x="7372434" y="4861424"/>
             <a:ext cx="303288" cy="338554"/>
           </a:xfrm>
           <a:prstGeom prst="rect">
@@ -8734,7 +8734,7 @@
         </p:nvSpPr>
         <p:spPr>
           <a:xfrm>
-            <a:off x="7872601" y="6014814"/>
+            <a:off x="7872601" y="4864113"/>
             <a:ext cx="296876" cy="338554"/>
           </a:xfrm>
           <a:prstGeom prst="rect">
@@ -8769,7 +8769,7 @@
         </p:nvSpPr>
         <p:spPr>
           <a:xfrm>
-            <a:off x="6929716" y="1602889"/>
+            <a:off x="6929716" y="452188"/>
             <a:ext cx="1457662" cy="1221891"/>
           </a:xfrm>
           <a:prstGeom prst="rect">
@@ -8821,7 +8821,7 @@
         </p:nvSpPr>
         <p:spPr>
           <a:xfrm>
-            <a:off x="2521928" y="2047462"/>
+            <a:off x="2521928" y="896761"/>
             <a:ext cx="996555" cy="369332"/>
           </a:xfrm>
           <a:prstGeom prst="rect">
@@ -8856,7 +8856,7 @@
         </p:nvSpPr>
         <p:spPr>
           <a:xfrm>
-            <a:off x="2521927" y="3244334"/>
+            <a:off x="2521927" y="2093633"/>
             <a:ext cx="996555" cy="369332"/>
           </a:xfrm>
           <a:prstGeom prst="rect">
@@ -8891,7 +8891,7 @@
         </p:nvSpPr>
         <p:spPr>
           <a:xfrm>
-            <a:off x="2521926" y="4441206"/>
+            <a:off x="2521926" y="3290505"/>
             <a:ext cx="996555" cy="369332"/>
           </a:xfrm>
           <a:prstGeom prst="rect">
@@ -8926,7 +8926,7 @@
         </p:nvSpPr>
         <p:spPr>
           <a:xfrm>
-            <a:off x="2521926" y="5638078"/>
+            <a:off x="2521926" y="4487377"/>
             <a:ext cx="996555" cy="369332"/>
           </a:xfrm>
           <a:prstGeom prst="rect">
@@ -8961,7 +8961,7 @@
         </p:nvSpPr>
         <p:spPr>
           <a:xfrm>
-            <a:off x="8660621" y="1274346"/>
+            <a:off x="8660621" y="123645"/>
             <a:ext cx="1898277" cy="461665"/>
           </a:xfrm>
           <a:prstGeom prst="rect">
@@ -9020,7 +9020,7 @@
         </p:nvCxnSpPr>
         <p:spPr>
           <a:xfrm flipV="1">
-            <a:off x="8387378" y="1505179"/>
+            <a:off x="8387378" y="354478"/>
             <a:ext cx="273243" cy="97710"/>
           </a:xfrm>
           <a:prstGeom prst="straightConnector1">
@@ -9062,7 +9062,7 @@
         </p:nvSpPr>
         <p:spPr>
           <a:xfrm>
-            <a:off x="2097157" y="1769165"/>
+            <a:off x="2097157" y="618464"/>
             <a:ext cx="447260" cy="4403035"/>
           </a:xfrm>
           <a:prstGeom prst="leftBrace">
@@ -9111,7 +9111,7 @@
         </p:nvSpPr>
         <p:spPr>
           <a:xfrm>
-            <a:off x="1083268" y="3766138"/>
+            <a:off x="1083268" y="2615437"/>
             <a:ext cx="1072217" cy="369332"/>
           </a:xfrm>
           <a:prstGeom prst="rect">
@@ -9198,7 +9198,7 @@
         </p:nvSpPr>
         <p:spPr>
           <a:xfrm>
-            <a:off x="3808209" y="1602889"/>
+            <a:off x="3808209" y="431639"/>
             <a:ext cx="4582757" cy="4765638"/>
           </a:xfrm>
           <a:prstGeom prst="rect">
@@ -9254,7 +9254,7 @@
         </p:nvCxnSpPr>
         <p:spPr>
           <a:xfrm>
-            <a:off x="3808209" y="3985708"/>
+            <a:off x="3808209" y="2814458"/>
             <a:ext cx="4582757" cy="0"/>
           </a:xfrm>
           <a:prstGeom prst="line">
@@ -9297,7 +9297,7 @@
         </p:nvCxnSpPr>
         <p:spPr>
           <a:xfrm>
-            <a:off x="3808209" y="5138570"/>
+            <a:off x="3808209" y="3967320"/>
             <a:ext cx="4582757" cy="0"/>
           </a:xfrm>
           <a:prstGeom prst="line">
@@ -9340,7 +9340,7 @@
         </p:nvCxnSpPr>
         <p:spPr>
           <a:xfrm>
-            <a:off x="3804621" y="2827468"/>
+            <a:off x="3804621" y="1656218"/>
             <a:ext cx="4582757" cy="0"/>
           </a:xfrm>
           <a:prstGeom prst="line">
@@ -9381,7 +9381,7 @@
         </p:nvCxnSpPr>
         <p:spPr>
           <a:xfrm>
-            <a:off x="5314281" y="1602889"/>
+            <a:off x="5314281" y="431639"/>
             <a:ext cx="0" cy="4765638"/>
           </a:xfrm>
           <a:prstGeom prst="line">
@@ -9422,7 +9422,7 @@
         </p:nvCxnSpPr>
         <p:spPr>
           <a:xfrm>
-            <a:off x="6929716" y="1602889"/>
+            <a:off x="6929716" y="431639"/>
             <a:ext cx="0" cy="4765638"/>
           </a:xfrm>
           <a:prstGeom prst="line">
@@ -9463,7 +9463,7 @@
         </p:nvSpPr>
         <p:spPr>
           <a:xfrm>
-            <a:off x="5771595" y="1688973"/>
+            <a:off x="5771595" y="517723"/>
             <a:ext cx="705834" cy="369332"/>
           </a:xfrm>
           <a:prstGeom prst="rect">
@@ -9498,7 +9498,7 @@
         </p:nvSpPr>
         <p:spPr>
           <a:xfrm>
-            <a:off x="4210841" y="1694351"/>
+            <a:off x="4210841" y="523101"/>
             <a:ext cx="705834" cy="369332"/>
           </a:xfrm>
           <a:prstGeom prst="rect">
@@ -9533,7 +9533,7 @@
         </p:nvSpPr>
         <p:spPr>
           <a:xfrm>
-            <a:off x="7308143" y="1694351"/>
+            <a:off x="7308143" y="523101"/>
             <a:ext cx="705834" cy="369332"/>
           </a:xfrm>
           <a:prstGeom prst="rect">
@@ -9568,7 +9568,7 @@
         </p:nvSpPr>
         <p:spPr>
           <a:xfrm>
-            <a:off x="5771595" y="2827468"/>
+            <a:off x="5771595" y="1656218"/>
             <a:ext cx="705834" cy="369332"/>
           </a:xfrm>
           <a:prstGeom prst="rect">
@@ -9603,7 +9603,7 @@
         </p:nvSpPr>
         <p:spPr>
           <a:xfrm>
-            <a:off x="4210841" y="2832846"/>
+            <a:off x="4210841" y="1661596"/>
             <a:ext cx="705834" cy="369332"/>
           </a:xfrm>
           <a:prstGeom prst="rect">
@@ -9638,7 +9638,7 @@
         </p:nvSpPr>
         <p:spPr>
           <a:xfrm>
-            <a:off x="7308143" y="2832846"/>
+            <a:off x="7308143" y="1661596"/>
             <a:ext cx="705834" cy="369332"/>
           </a:xfrm>
           <a:prstGeom prst="rect">
@@ -9673,7 +9673,7 @@
         </p:nvSpPr>
         <p:spPr>
           <a:xfrm>
-            <a:off x="5771595" y="4000074"/>
+            <a:off x="5771595" y="2828824"/>
             <a:ext cx="705834" cy="369332"/>
           </a:xfrm>
           <a:prstGeom prst="rect">
@@ -9708,7 +9708,7 @@
         </p:nvSpPr>
         <p:spPr>
           <a:xfrm>
-            <a:off x="4210841" y="4005452"/>
+            <a:off x="4210841" y="2834202"/>
             <a:ext cx="705834" cy="369332"/>
           </a:xfrm>
           <a:prstGeom prst="rect">
@@ -9743,7 +9743,7 @@
         </p:nvSpPr>
         <p:spPr>
           <a:xfrm>
-            <a:off x="7308143" y="4005452"/>
+            <a:off x="7308143" y="2834202"/>
             <a:ext cx="705834" cy="369332"/>
           </a:xfrm>
           <a:prstGeom prst="rect">
@@ -9778,7 +9778,7 @@
         </p:nvSpPr>
         <p:spPr>
           <a:xfrm>
-            <a:off x="5771595" y="5152935"/>
+            <a:off x="5771595" y="3981685"/>
             <a:ext cx="705834" cy="369332"/>
           </a:xfrm>
           <a:prstGeom prst="rect">
@@ -9813,7 +9813,7 @@
         </p:nvSpPr>
         <p:spPr>
           <a:xfrm>
-            <a:off x="4210841" y="5158313"/>
+            <a:off x="4210841" y="3987063"/>
             <a:ext cx="705834" cy="369332"/>
           </a:xfrm>
           <a:prstGeom prst="rect">
@@ -9848,7 +9848,7 @@
         </p:nvSpPr>
         <p:spPr>
           <a:xfrm>
-            <a:off x="7308143" y="5158313"/>
+            <a:off x="7308143" y="3987063"/>
             <a:ext cx="705834" cy="369332"/>
           </a:xfrm>
           <a:prstGeom prst="rect">
@@ -9883,7 +9883,7 @@
         </p:nvCxnSpPr>
         <p:spPr>
           <a:xfrm>
-            <a:off x="4293705" y="1614566"/>
+            <a:off x="4293705" y="443316"/>
             <a:ext cx="0" cy="4771015"/>
           </a:xfrm>
           <a:prstGeom prst="line">
@@ -9924,7 +9924,7 @@
         </p:nvCxnSpPr>
         <p:spPr>
           <a:xfrm>
-            <a:off x="4803913" y="1597512"/>
+            <a:off x="4803913" y="426262"/>
             <a:ext cx="0" cy="4771015"/>
           </a:xfrm>
           <a:prstGeom prst="line">
@@ -9965,7 +9965,7 @@
         </p:nvCxnSpPr>
         <p:spPr>
           <a:xfrm>
-            <a:off x="5857462" y="1608845"/>
+            <a:off x="5857462" y="437595"/>
             <a:ext cx="0" cy="4771015"/>
           </a:xfrm>
           <a:prstGeom prst="line">
@@ -10006,7 +10006,7 @@
         </p:nvCxnSpPr>
         <p:spPr>
           <a:xfrm>
-            <a:off x="6367670" y="1591791"/>
+            <a:off x="6367670" y="420541"/>
             <a:ext cx="0" cy="4771015"/>
           </a:xfrm>
           <a:prstGeom prst="line">
@@ -10047,7 +10047,7 @@
         </p:nvCxnSpPr>
         <p:spPr>
           <a:xfrm>
-            <a:off x="7411279" y="1619943"/>
+            <a:off x="7411279" y="448693"/>
             <a:ext cx="0" cy="4771015"/>
           </a:xfrm>
           <a:prstGeom prst="line">
@@ -10088,7 +10088,7 @@
         </p:nvCxnSpPr>
         <p:spPr>
           <a:xfrm>
-            <a:off x="7921487" y="1602889"/>
+            <a:off x="7921487" y="431639"/>
             <a:ext cx="0" cy="4771015"/>
           </a:xfrm>
           <a:prstGeom prst="line">
@@ -10129,7 +10129,7 @@
         </p:nvSpPr>
         <p:spPr>
           <a:xfrm>
-            <a:off x="3801095" y="2486226"/>
+            <a:off x="3801095" y="1314976"/>
             <a:ext cx="293670" cy="338554"/>
           </a:xfrm>
           <a:prstGeom prst="rect">
@@ -10164,7 +10164,7 @@
         </p:nvSpPr>
         <p:spPr>
           <a:xfrm>
-            <a:off x="4273735" y="2488914"/>
+            <a:off x="4273735" y="1317664"/>
             <a:ext cx="303288" cy="338554"/>
           </a:xfrm>
           <a:prstGeom prst="rect">
@@ -10199,7 +10199,7 @@
         </p:nvSpPr>
         <p:spPr>
           <a:xfrm>
-            <a:off x="4773902" y="2491603"/>
+            <a:off x="4773902" y="1320353"/>
             <a:ext cx="296876" cy="338554"/>
           </a:xfrm>
           <a:prstGeom prst="rect">
@@ -10234,7 +10234,7 @@
         </p:nvSpPr>
         <p:spPr>
           <a:xfrm>
-            <a:off x="5348288" y="2499726"/>
+            <a:off x="5348288" y="1328476"/>
             <a:ext cx="303288" cy="338554"/>
           </a:xfrm>
           <a:prstGeom prst="rect">
@@ -10269,7 +10269,7 @@
         </p:nvSpPr>
         <p:spPr>
           <a:xfrm>
-            <a:off x="5820928" y="2502414"/>
+            <a:off x="5820928" y="1331164"/>
             <a:ext cx="296876" cy="338554"/>
           </a:xfrm>
           <a:prstGeom prst="rect">
@@ -10304,7 +10304,7 @@
         </p:nvSpPr>
         <p:spPr>
           <a:xfrm>
-            <a:off x="6350912" y="2505103"/>
+            <a:off x="6350912" y="1333853"/>
             <a:ext cx="293670" cy="338554"/>
           </a:xfrm>
           <a:prstGeom prst="rect">
@@ -10339,7 +10339,7 @@
         </p:nvSpPr>
         <p:spPr>
           <a:xfrm>
-            <a:off x="6893607" y="2498792"/>
+            <a:off x="6893607" y="1327542"/>
             <a:ext cx="293670" cy="338554"/>
           </a:xfrm>
           <a:prstGeom prst="rect">
@@ -10374,7 +10374,7 @@
         </p:nvSpPr>
         <p:spPr>
           <a:xfrm>
-            <a:off x="7366247" y="2501480"/>
+            <a:off x="7366247" y="1330230"/>
             <a:ext cx="296876" cy="338554"/>
           </a:xfrm>
           <a:prstGeom prst="rect">
@@ -10409,7 +10409,7 @@
         </p:nvSpPr>
         <p:spPr>
           <a:xfrm>
-            <a:off x="7866414" y="2504169"/>
+            <a:off x="7866414" y="1332919"/>
             <a:ext cx="303288" cy="338554"/>
           </a:xfrm>
           <a:prstGeom prst="rect">
@@ -10444,7 +10444,7 @@
         </p:nvSpPr>
         <p:spPr>
           <a:xfrm>
-            <a:off x="3801095" y="3644626"/>
+            <a:off x="3801095" y="2473376"/>
             <a:ext cx="303288" cy="338554"/>
           </a:xfrm>
           <a:prstGeom prst="rect">
@@ -10479,7 +10479,7 @@
         </p:nvSpPr>
         <p:spPr>
           <a:xfrm>
-            <a:off x="4273735" y="3647314"/>
+            <a:off x="4273735" y="2476064"/>
             <a:ext cx="293670" cy="338554"/>
           </a:xfrm>
           <a:prstGeom prst="rect">
@@ -10514,7 +10514,7 @@
         </p:nvSpPr>
         <p:spPr>
           <a:xfrm>
-            <a:off x="4773902" y="3650003"/>
+            <a:off x="4773902" y="2478753"/>
             <a:ext cx="296876" cy="338554"/>
           </a:xfrm>
           <a:prstGeom prst="rect">
@@ -10549,7 +10549,7 @@
         </p:nvSpPr>
         <p:spPr>
           <a:xfrm>
-            <a:off x="5348288" y="3658126"/>
+            <a:off x="5348288" y="2486876"/>
             <a:ext cx="293670" cy="338554"/>
           </a:xfrm>
           <a:prstGeom prst="rect">
@@ -10584,7 +10584,7 @@
         </p:nvSpPr>
         <p:spPr>
           <a:xfrm>
-            <a:off x="5820928" y="3660814"/>
+            <a:off x="5820928" y="2489564"/>
             <a:ext cx="303288" cy="338554"/>
           </a:xfrm>
           <a:prstGeom prst="rect">
@@ -10619,7 +10619,7 @@
         </p:nvSpPr>
         <p:spPr>
           <a:xfrm>
-            <a:off x="6350912" y="3663503"/>
+            <a:off x="6350912" y="2492253"/>
             <a:ext cx="296876" cy="338554"/>
           </a:xfrm>
           <a:prstGeom prst="rect">
@@ -10654,7 +10654,7 @@
         </p:nvSpPr>
         <p:spPr>
           <a:xfrm>
-            <a:off x="6893607" y="3657192"/>
+            <a:off x="6893607" y="2485942"/>
             <a:ext cx="296876" cy="338554"/>
           </a:xfrm>
           <a:prstGeom prst="rect">
@@ -10689,7 +10689,7 @@
         </p:nvSpPr>
         <p:spPr>
           <a:xfrm>
-            <a:off x="7366247" y="3659880"/>
+            <a:off x="7366247" y="2488630"/>
             <a:ext cx="293670" cy="338554"/>
           </a:xfrm>
           <a:prstGeom prst="rect">
@@ -10724,7 +10724,7 @@
         </p:nvSpPr>
         <p:spPr>
           <a:xfrm>
-            <a:off x="7866414" y="3662569"/>
+            <a:off x="7866414" y="2491319"/>
             <a:ext cx="303288" cy="338554"/>
           </a:xfrm>
           <a:prstGeom prst="rect">
@@ -10759,7 +10759,7 @@
         </p:nvSpPr>
         <p:spPr>
           <a:xfrm>
-            <a:off x="3801095" y="4780318"/>
+            <a:off x="3801095" y="3609068"/>
             <a:ext cx="296876" cy="338554"/>
           </a:xfrm>
           <a:prstGeom prst="rect">
@@ -10794,7 +10794,7 @@
         </p:nvSpPr>
         <p:spPr>
           <a:xfrm>
-            <a:off x="4273735" y="4783006"/>
+            <a:off x="4273735" y="3611756"/>
             <a:ext cx="293670" cy="338554"/>
           </a:xfrm>
           <a:prstGeom prst="rect">
@@ -10829,7 +10829,7 @@
         </p:nvSpPr>
         <p:spPr>
           <a:xfrm>
-            <a:off x="4773902" y="4785695"/>
+            <a:off x="4773902" y="3614445"/>
             <a:ext cx="303288" cy="338554"/>
           </a:xfrm>
           <a:prstGeom prst="rect">
@@ -10864,7 +10864,7 @@
         </p:nvSpPr>
         <p:spPr>
           <a:xfrm>
-            <a:off x="5348288" y="4793818"/>
+            <a:off x="5348288" y="3622568"/>
             <a:ext cx="303288" cy="338554"/>
           </a:xfrm>
           <a:prstGeom prst="rect">
@@ -10899,7 +10899,7 @@
         </p:nvSpPr>
         <p:spPr>
           <a:xfrm>
-            <a:off x="5820928" y="4796506"/>
+            <a:off x="5820928" y="3625256"/>
             <a:ext cx="296876" cy="338554"/>
           </a:xfrm>
           <a:prstGeom prst="rect">
@@ -10934,7 +10934,7 @@
         </p:nvSpPr>
         <p:spPr>
           <a:xfrm>
-            <a:off x="6350912" y="4799195"/>
+            <a:off x="6350912" y="3627945"/>
             <a:ext cx="293670" cy="338554"/>
           </a:xfrm>
           <a:prstGeom prst="rect">
@@ -10969,7 +10969,7 @@
         </p:nvSpPr>
         <p:spPr>
           <a:xfrm>
-            <a:off x="6893607" y="4792884"/>
+            <a:off x="6893607" y="3621634"/>
             <a:ext cx="296876" cy="338554"/>
           </a:xfrm>
           <a:prstGeom prst="rect">
@@ -11004,7 +11004,7 @@
         </p:nvSpPr>
         <p:spPr>
           <a:xfrm>
-            <a:off x="7366247" y="4795572"/>
+            <a:off x="7366247" y="3624322"/>
             <a:ext cx="293670" cy="338554"/>
           </a:xfrm>
           <a:prstGeom prst="rect">
@@ -11039,7 +11039,7 @@
         </p:nvSpPr>
         <p:spPr>
           <a:xfrm>
-            <a:off x="7866414" y="4798261"/>
+            <a:off x="7866414" y="3627011"/>
             <a:ext cx="303288" cy="338554"/>
           </a:xfrm>
           <a:prstGeom prst="rect">
@@ -11074,7 +11074,7 @@
         </p:nvSpPr>
         <p:spPr>
           <a:xfrm>
-            <a:off x="3807282" y="5996871"/>
+            <a:off x="3807282" y="4825621"/>
             <a:ext cx="303288" cy="338554"/>
           </a:xfrm>
           <a:prstGeom prst="rect">
@@ -11109,7 +11109,7 @@
         </p:nvSpPr>
         <p:spPr>
           <a:xfrm>
-            <a:off x="4279922" y="5999559"/>
+            <a:off x="4279922" y="4828309"/>
             <a:ext cx="293670" cy="338554"/>
           </a:xfrm>
           <a:prstGeom prst="rect">
@@ -11144,7 +11144,7 @@
         </p:nvSpPr>
         <p:spPr>
           <a:xfrm>
-            <a:off x="4780089" y="6002248"/>
+            <a:off x="4780089" y="4830998"/>
             <a:ext cx="296876" cy="338554"/>
           </a:xfrm>
           <a:prstGeom prst="rect">
@@ -11179,7 +11179,7 @@
         </p:nvSpPr>
         <p:spPr>
           <a:xfrm>
-            <a:off x="5354475" y="6010371"/>
+            <a:off x="5354475" y="4839121"/>
             <a:ext cx="303288" cy="338554"/>
           </a:xfrm>
           <a:prstGeom prst="rect">
@@ -11214,7 +11214,7 @@
         </p:nvSpPr>
         <p:spPr>
           <a:xfrm>
-            <a:off x="5827115" y="6013059"/>
+            <a:off x="5827115" y="4841809"/>
             <a:ext cx="296876" cy="338554"/>
           </a:xfrm>
           <a:prstGeom prst="rect">
@@ -11249,7 +11249,7 @@
         </p:nvSpPr>
         <p:spPr>
           <a:xfrm>
-            <a:off x="6357099" y="6015748"/>
+            <a:off x="6357099" y="4844498"/>
             <a:ext cx="293670" cy="338554"/>
           </a:xfrm>
           <a:prstGeom prst="rect">
@@ -11284,7 +11284,7 @@
         </p:nvSpPr>
         <p:spPr>
           <a:xfrm>
-            <a:off x="6899794" y="6009437"/>
+            <a:off x="6899794" y="4838187"/>
             <a:ext cx="293670" cy="338554"/>
           </a:xfrm>
           <a:prstGeom prst="rect">
@@ -11319,7 +11319,7 @@
         </p:nvSpPr>
         <p:spPr>
           <a:xfrm>
-            <a:off x="7372434" y="6012125"/>
+            <a:off x="7372434" y="4840875"/>
             <a:ext cx="303288" cy="338554"/>
           </a:xfrm>
           <a:prstGeom prst="rect">
@@ -11354,7 +11354,7 @@
         </p:nvSpPr>
         <p:spPr>
           <a:xfrm>
-            <a:off x="7872601" y="6014814"/>
+            <a:off x="7872601" y="4843564"/>
             <a:ext cx="296876" cy="338554"/>
           </a:xfrm>
           <a:prstGeom prst="rect">
@@ -11389,7 +11389,7 @@
         </p:nvSpPr>
         <p:spPr>
           <a:xfrm>
-            <a:off x="6929716" y="1602889"/>
+            <a:off x="6929716" y="431639"/>
             <a:ext cx="1457662" cy="1221891"/>
           </a:xfrm>
           <a:prstGeom prst="rect">
@@ -11441,7 +11441,7 @@
         </p:nvSpPr>
         <p:spPr>
           <a:xfrm>
-            <a:off x="8660621" y="1274346"/>
+            <a:off x="8660621" y="103096"/>
             <a:ext cx="1898277" cy="461665"/>
           </a:xfrm>
           <a:prstGeom prst="rect">
@@ -11500,7 +11500,7 @@
         </p:nvCxnSpPr>
         <p:spPr>
           <a:xfrm flipV="1">
-            <a:off x="8387378" y="1505179"/>
+            <a:off x="8387378" y="333929"/>
             <a:ext cx="273243" cy="97710"/>
           </a:xfrm>
           <a:prstGeom prst="straightConnector1">
@@ -11542,7 +11542,7 @@
         </p:nvSpPr>
         <p:spPr>
           <a:xfrm>
-            <a:off x="7921487" y="1602889"/>
+            <a:off x="7921487" y="431639"/>
             <a:ext cx="465891" cy="1221891"/>
           </a:xfrm>
           <a:prstGeom prst="rect">
@@ -11596,7 +11596,7 @@
         </p:nvCxnSpPr>
         <p:spPr>
           <a:xfrm>
-            <a:off x="8387378" y="2213835"/>
+            <a:off x="8387378" y="1042585"/>
             <a:ext cx="388874" cy="202959"/>
           </a:xfrm>
           <a:prstGeom prst="straightConnector1">
@@ -11635,7 +11635,7 @@
         </p:nvSpPr>
         <p:spPr>
           <a:xfrm>
-            <a:off x="8737387" y="2144260"/>
+            <a:off x="8737387" y="973010"/>
             <a:ext cx="1579150" cy="461665"/>
           </a:xfrm>
           <a:prstGeom prst="rect">
@@ -11692,7 +11692,7 @@
         </p:nvSpPr>
         <p:spPr>
           <a:xfrm>
-            <a:off x="2521928" y="2047462"/>
+            <a:off x="2521928" y="876212"/>
             <a:ext cx="996555" cy="369332"/>
           </a:xfrm>
           <a:prstGeom prst="rect">
@@ -11727,7 +11727,7 @@
         </p:nvSpPr>
         <p:spPr>
           <a:xfrm>
-            <a:off x="2521927" y="3244334"/>
+            <a:off x="2521927" y="2073084"/>
             <a:ext cx="996555" cy="369332"/>
           </a:xfrm>
           <a:prstGeom prst="rect">
@@ -11762,7 +11762,7 @@
         </p:nvSpPr>
         <p:spPr>
           <a:xfrm>
-            <a:off x="2521926" y="4441206"/>
+            <a:off x="2521926" y="3269956"/>
             <a:ext cx="996555" cy="369332"/>
           </a:xfrm>
           <a:prstGeom prst="rect">
@@ -11797,7 +11797,7 @@
         </p:nvSpPr>
         <p:spPr>
           <a:xfrm>
-            <a:off x="2521926" y="5638078"/>
+            <a:off x="2521926" y="4466828"/>
             <a:ext cx="996555" cy="369332"/>
           </a:xfrm>
           <a:prstGeom prst="rect">
@@ -11832,7 +11832,7 @@
         </p:nvSpPr>
         <p:spPr>
           <a:xfrm>
-            <a:off x="2097157" y="1769165"/>
+            <a:off x="2097157" y="597915"/>
             <a:ext cx="447260" cy="4403035"/>
           </a:xfrm>
           <a:prstGeom prst="leftBrace">
@@ -11881,7 +11881,7 @@
         </p:nvSpPr>
         <p:spPr>
           <a:xfrm>
-            <a:off x="1083268" y="3766138"/>
+            <a:off x="1083268" y="2594888"/>
             <a:ext cx="1072217" cy="369332"/>
           </a:xfrm>
           <a:prstGeom prst="rect">
@@ -15255,7 +15255,7 @@
         </p:nvSpPr>
         <p:spPr>
           <a:xfrm>
-            <a:off x="3808209" y="1602889"/>
+            <a:off x="3808209" y="411092"/>
             <a:ext cx="4582757" cy="4765638"/>
           </a:xfrm>
           <a:prstGeom prst="rect">
@@ -15311,7 +15311,7 @@
         </p:nvCxnSpPr>
         <p:spPr>
           <a:xfrm>
-            <a:off x="3808209" y="3985708"/>
+            <a:off x="3808209" y="2793911"/>
             <a:ext cx="4582757" cy="0"/>
           </a:xfrm>
           <a:prstGeom prst="line">
@@ -15354,7 +15354,7 @@
         </p:nvCxnSpPr>
         <p:spPr>
           <a:xfrm>
-            <a:off x="3808209" y="5138570"/>
+            <a:off x="3808209" y="3946773"/>
             <a:ext cx="4582757" cy="0"/>
           </a:xfrm>
           <a:prstGeom prst="line">
@@ -15397,7 +15397,7 @@
         </p:nvCxnSpPr>
         <p:spPr>
           <a:xfrm>
-            <a:off x="3804621" y="2827468"/>
+            <a:off x="3804621" y="1635671"/>
             <a:ext cx="4582757" cy="0"/>
           </a:xfrm>
           <a:prstGeom prst="line">
@@ -15438,7 +15438,7 @@
         </p:nvSpPr>
         <p:spPr>
           <a:xfrm>
-            <a:off x="2521928" y="2047462"/>
+            <a:off x="2521928" y="855665"/>
             <a:ext cx="996555" cy="369332"/>
           </a:xfrm>
           <a:prstGeom prst="rect">
@@ -15473,7 +15473,7 @@
         </p:nvSpPr>
         <p:spPr>
           <a:xfrm>
-            <a:off x="2521927" y="3244334"/>
+            <a:off x="2521927" y="2052537"/>
             <a:ext cx="996555" cy="369332"/>
           </a:xfrm>
           <a:prstGeom prst="rect">
@@ -15508,7 +15508,7 @@
         </p:nvSpPr>
         <p:spPr>
           <a:xfrm>
-            <a:off x="2521926" y="4441206"/>
+            <a:off x="2521926" y="3249409"/>
             <a:ext cx="996555" cy="369332"/>
           </a:xfrm>
           <a:prstGeom prst="rect">
@@ -15543,7 +15543,7 @@
         </p:nvSpPr>
         <p:spPr>
           <a:xfrm>
-            <a:off x="2521926" y="5638078"/>
+            <a:off x="2521926" y="4446281"/>
             <a:ext cx="996555" cy="369332"/>
           </a:xfrm>
           <a:prstGeom prst="rect">
@@ -15608,7 +15608,7 @@
         </p:nvSpPr>
         <p:spPr>
           <a:xfrm>
-            <a:off x="3808209" y="1602889"/>
+            <a:off x="3808209" y="606299"/>
             <a:ext cx="4582757" cy="4765638"/>
           </a:xfrm>
           <a:prstGeom prst="rect">
@@ -15664,7 +15664,7 @@
         </p:nvCxnSpPr>
         <p:spPr>
           <a:xfrm>
-            <a:off x="3808209" y="3985708"/>
+            <a:off x="3808209" y="2989118"/>
             <a:ext cx="4582757" cy="0"/>
           </a:xfrm>
           <a:prstGeom prst="line">
@@ -15707,7 +15707,7 @@
         </p:nvCxnSpPr>
         <p:spPr>
           <a:xfrm>
-            <a:off x="3808209" y="5138570"/>
+            <a:off x="3808209" y="4141980"/>
             <a:ext cx="4582757" cy="0"/>
           </a:xfrm>
           <a:prstGeom prst="line">
@@ -15750,7 +15750,7 @@
         </p:nvCxnSpPr>
         <p:spPr>
           <a:xfrm>
-            <a:off x="3804621" y="2827468"/>
+            <a:off x="3804621" y="1830878"/>
             <a:ext cx="4582757" cy="0"/>
           </a:xfrm>
           <a:prstGeom prst="line">
@@ -15791,7 +15791,7 @@
         </p:nvCxnSpPr>
         <p:spPr>
           <a:xfrm>
-            <a:off x="5314281" y="1602889"/>
+            <a:off x="5314281" y="606299"/>
             <a:ext cx="0" cy="4765638"/>
           </a:xfrm>
           <a:prstGeom prst="line">
@@ -15832,7 +15832,7 @@
         </p:nvCxnSpPr>
         <p:spPr>
           <a:xfrm>
-            <a:off x="6929716" y="1602889"/>
+            <a:off x="6929716" y="606299"/>
             <a:ext cx="0" cy="4765638"/>
           </a:xfrm>
           <a:prstGeom prst="line">
@@ -15873,7 +15873,7 @@
         </p:nvSpPr>
         <p:spPr>
           <a:xfrm>
-            <a:off x="2521928" y="2047462"/>
+            <a:off x="2521928" y="1050872"/>
             <a:ext cx="996555" cy="369332"/>
           </a:xfrm>
           <a:prstGeom prst="rect">
@@ -15908,7 +15908,7 @@
         </p:nvSpPr>
         <p:spPr>
           <a:xfrm>
-            <a:off x="2521927" y="3244334"/>
+            <a:off x="2521927" y="2247744"/>
             <a:ext cx="996555" cy="369332"/>
           </a:xfrm>
           <a:prstGeom prst="rect">
@@ -15943,7 +15943,7 @@
         </p:nvSpPr>
         <p:spPr>
           <a:xfrm>
-            <a:off x="2521926" y="4441206"/>
+            <a:off x="2521926" y="3444616"/>
             <a:ext cx="996555" cy="369332"/>
           </a:xfrm>
           <a:prstGeom prst="rect">
@@ -15978,7 +15978,7 @@
         </p:nvSpPr>
         <p:spPr>
           <a:xfrm>
-            <a:off x="2521926" y="5638078"/>
+            <a:off x="2521926" y="4641488"/>
             <a:ext cx="996555" cy="369332"/>
           </a:xfrm>
           <a:prstGeom prst="rect">
@@ -16043,7 +16043,7 @@
         </p:nvSpPr>
         <p:spPr>
           <a:xfrm>
-            <a:off x="3808209" y="1602889"/>
+            <a:off x="3808209" y="431638"/>
             <a:ext cx="4582757" cy="4765638"/>
           </a:xfrm>
           <a:prstGeom prst="rect">
@@ -16099,7 +16099,7 @@
         </p:nvCxnSpPr>
         <p:spPr>
           <a:xfrm>
-            <a:off x="3808209" y="3985708"/>
+            <a:off x="3808209" y="2814457"/>
             <a:ext cx="4582757" cy="0"/>
           </a:xfrm>
           <a:prstGeom prst="line">
@@ -16142,7 +16142,7 @@
         </p:nvCxnSpPr>
         <p:spPr>
           <a:xfrm>
-            <a:off x="3808209" y="5138570"/>
+            <a:off x="3808209" y="3967319"/>
             <a:ext cx="4582757" cy="0"/>
           </a:xfrm>
           <a:prstGeom prst="line">
@@ -16185,7 +16185,7 @@
         </p:nvCxnSpPr>
         <p:spPr>
           <a:xfrm>
-            <a:off x="3804621" y="2827468"/>
+            <a:off x="3804621" y="1656217"/>
             <a:ext cx="4582757" cy="0"/>
           </a:xfrm>
           <a:prstGeom prst="line">
@@ -16226,7 +16226,7 @@
         </p:nvCxnSpPr>
         <p:spPr>
           <a:xfrm>
-            <a:off x="5314281" y="1602889"/>
+            <a:off x="5314281" y="431638"/>
             <a:ext cx="0" cy="4765638"/>
           </a:xfrm>
           <a:prstGeom prst="line">
@@ -16267,7 +16267,7 @@
         </p:nvCxnSpPr>
         <p:spPr>
           <a:xfrm>
-            <a:off x="6929716" y="1602889"/>
+            <a:off x="6929716" y="431638"/>
             <a:ext cx="0" cy="4765638"/>
           </a:xfrm>
           <a:prstGeom prst="line">
@@ -16308,7 +16308,7 @@
         </p:nvSpPr>
         <p:spPr>
           <a:xfrm>
-            <a:off x="5734524" y="1688973"/>
+            <a:off x="5734524" y="517722"/>
             <a:ext cx="705834" cy="369332"/>
           </a:xfrm>
           <a:prstGeom prst="rect">
@@ -16343,7 +16343,7 @@
         </p:nvSpPr>
         <p:spPr>
           <a:xfrm>
-            <a:off x="4173770" y="1694351"/>
+            <a:off x="4173770" y="523100"/>
             <a:ext cx="705834" cy="369332"/>
           </a:xfrm>
           <a:prstGeom prst="rect">
@@ -16378,7 +16378,7 @@
         </p:nvSpPr>
         <p:spPr>
           <a:xfrm>
-            <a:off x="7271072" y="1694351"/>
+            <a:off x="7271072" y="523100"/>
             <a:ext cx="705834" cy="369332"/>
           </a:xfrm>
           <a:prstGeom prst="rect">
@@ -16413,7 +16413,7 @@
         </p:nvSpPr>
         <p:spPr>
           <a:xfrm>
-            <a:off x="5734524" y="2827468"/>
+            <a:off x="5734524" y="1656217"/>
             <a:ext cx="705834" cy="369332"/>
           </a:xfrm>
           <a:prstGeom prst="rect">
@@ -16448,7 +16448,7 @@
         </p:nvSpPr>
         <p:spPr>
           <a:xfrm>
-            <a:off x="4173770" y="2832846"/>
+            <a:off x="4173770" y="1661595"/>
             <a:ext cx="705834" cy="369332"/>
           </a:xfrm>
           <a:prstGeom prst="rect">
@@ -16483,7 +16483,7 @@
         </p:nvSpPr>
         <p:spPr>
           <a:xfrm>
-            <a:off x="7271072" y="2832846"/>
+            <a:off x="7271072" y="1661595"/>
             <a:ext cx="705834" cy="369332"/>
           </a:xfrm>
           <a:prstGeom prst="rect">
@@ -16518,7 +16518,7 @@
         </p:nvSpPr>
         <p:spPr>
           <a:xfrm>
-            <a:off x="5734524" y="4000074"/>
+            <a:off x="5734524" y="2828823"/>
             <a:ext cx="705834" cy="369332"/>
           </a:xfrm>
           <a:prstGeom prst="rect">
@@ -16553,7 +16553,7 @@
         </p:nvSpPr>
         <p:spPr>
           <a:xfrm>
-            <a:off x="4173770" y="4005452"/>
+            <a:off x="4173770" y="2834201"/>
             <a:ext cx="705834" cy="369332"/>
           </a:xfrm>
           <a:prstGeom prst="rect">
@@ -16588,7 +16588,7 @@
         </p:nvSpPr>
         <p:spPr>
           <a:xfrm>
-            <a:off x="7271072" y="4005452"/>
+            <a:off x="7271072" y="2834201"/>
             <a:ext cx="705834" cy="369332"/>
           </a:xfrm>
           <a:prstGeom prst="rect">
@@ -16623,7 +16623,7 @@
         </p:nvSpPr>
         <p:spPr>
           <a:xfrm>
-            <a:off x="5734524" y="5152935"/>
+            <a:off x="5734524" y="3981684"/>
             <a:ext cx="705834" cy="369332"/>
           </a:xfrm>
           <a:prstGeom prst="rect">
@@ -16658,7 +16658,7 @@
         </p:nvSpPr>
         <p:spPr>
           <a:xfrm>
-            <a:off x="4173770" y="5158313"/>
+            <a:off x="4173770" y="3987062"/>
             <a:ext cx="705834" cy="369332"/>
           </a:xfrm>
           <a:prstGeom prst="rect">
@@ -16693,7 +16693,7 @@
         </p:nvSpPr>
         <p:spPr>
           <a:xfrm>
-            <a:off x="7271072" y="5158313"/>
+            <a:off x="7271072" y="3987062"/>
             <a:ext cx="705834" cy="369332"/>
           </a:xfrm>
           <a:prstGeom prst="rect">
@@ -16728,7 +16728,7 @@
         </p:nvSpPr>
         <p:spPr>
           <a:xfrm>
-            <a:off x="2521928" y="2047462"/>
+            <a:off x="2521928" y="876211"/>
             <a:ext cx="996555" cy="369332"/>
           </a:xfrm>
           <a:prstGeom prst="rect">
@@ -16763,7 +16763,7 @@
         </p:nvSpPr>
         <p:spPr>
           <a:xfrm>
-            <a:off x="2521927" y="3244334"/>
+            <a:off x="2521927" y="2073083"/>
             <a:ext cx="996555" cy="369332"/>
           </a:xfrm>
           <a:prstGeom prst="rect">
@@ -16798,7 +16798,7 @@
         </p:nvSpPr>
         <p:spPr>
           <a:xfrm>
-            <a:off x="2521926" y="4441206"/>
+            <a:off x="2521926" y="3269955"/>
             <a:ext cx="996555" cy="369332"/>
           </a:xfrm>
           <a:prstGeom prst="rect">
@@ -16833,7 +16833,7 @@
         </p:nvSpPr>
         <p:spPr>
           <a:xfrm>
-            <a:off x="2521926" y="5638078"/>
+            <a:off x="2521926" y="4466827"/>
             <a:ext cx="996555" cy="369332"/>
           </a:xfrm>
           <a:prstGeom prst="rect">
@@ -16898,7 +16898,7 @@
         </p:nvSpPr>
         <p:spPr>
           <a:xfrm>
-            <a:off x="3808209" y="1602889"/>
+            <a:off x="3808209" y="483009"/>
             <a:ext cx="4582757" cy="4765638"/>
           </a:xfrm>
           <a:prstGeom prst="rect">
@@ -16954,7 +16954,7 @@
         </p:nvCxnSpPr>
         <p:spPr>
           <a:xfrm>
-            <a:off x="3808209" y="3985708"/>
+            <a:off x="3808209" y="2865828"/>
             <a:ext cx="4582757" cy="0"/>
           </a:xfrm>
           <a:prstGeom prst="line">
@@ -16997,7 +16997,7 @@
         </p:nvCxnSpPr>
         <p:spPr>
           <a:xfrm>
-            <a:off x="3808209" y="5138570"/>
+            <a:off x="3808209" y="4018690"/>
             <a:ext cx="4582757" cy="0"/>
           </a:xfrm>
           <a:prstGeom prst="line">
@@ -17040,7 +17040,7 @@
         </p:nvCxnSpPr>
         <p:spPr>
           <a:xfrm>
-            <a:off x="3804621" y="2827468"/>
+            <a:off x="3804621" y="1707588"/>
             <a:ext cx="4582757" cy="0"/>
           </a:xfrm>
           <a:prstGeom prst="line">
@@ -17081,7 +17081,7 @@
         </p:nvCxnSpPr>
         <p:spPr>
           <a:xfrm>
-            <a:off x="5314281" y="1602889"/>
+            <a:off x="5314281" y="483009"/>
             <a:ext cx="0" cy="4765638"/>
           </a:xfrm>
           <a:prstGeom prst="line">
@@ -17122,7 +17122,7 @@
         </p:nvCxnSpPr>
         <p:spPr>
           <a:xfrm>
-            <a:off x="6929716" y="1602889"/>
+            <a:off x="6929716" y="483009"/>
             <a:ext cx="0" cy="4765638"/>
           </a:xfrm>
           <a:prstGeom prst="line">
@@ -17163,7 +17163,7 @@
         </p:nvSpPr>
         <p:spPr>
           <a:xfrm>
-            <a:off x="5709810" y="1688973"/>
+            <a:off x="5761180" y="569093"/>
             <a:ext cx="705834" cy="369332"/>
           </a:xfrm>
           <a:prstGeom prst="rect">
@@ -17198,7 +17198,7 @@
         </p:nvSpPr>
         <p:spPr>
           <a:xfrm>
-            <a:off x="4149056" y="1694351"/>
+            <a:off x="4200426" y="574471"/>
             <a:ext cx="705834" cy="369332"/>
           </a:xfrm>
           <a:prstGeom prst="rect">
@@ -17233,7 +17233,7 @@
         </p:nvSpPr>
         <p:spPr>
           <a:xfrm>
-            <a:off x="7246358" y="1694351"/>
+            <a:off x="7318276" y="574471"/>
             <a:ext cx="705834" cy="369332"/>
           </a:xfrm>
           <a:prstGeom prst="rect">
@@ -17268,7 +17268,7 @@
         </p:nvSpPr>
         <p:spPr>
           <a:xfrm>
-            <a:off x="5709810" y="2827468"/>
+            <a:off x="5761180" y="1707588"/>
             <a:ext cx="705834" cy="369332"/>
           </a:xfrm>
           <a:prstGeom prst="rect">
@@ -17303,7 +17303,7 @@
         </p:nvSpPr>
         <p:spPr>
           <a:xfrm>
-            <a:off x="4149056" y="2832846"/>
+            <a:off x="4200426" y="1712966"/>
             <a:ext cx="705834" cy="369332"/>
           </a:xfrm>
           <a:prstGeom prst="rect">
@@ -17338,7 +17338,7 @@
         </p:nvSpPr>
         <p:spPr>
           <a:xfrm>
-            <a:off x="7246358" y="2832846"/>
+            <a:off x="7318276" y="1712966"/>
             <a:ext cx="705834" cy="369332"/>
           </a:xfrm>
           <a:prstGeom prst="rect">
@@ -17373,7 +17373,7 @@
         </p:nvSpPr>
         <p:spPr>
           <a:xfrm>
-            <a:off x="5709810" y="4000074"/>
+            <a:off x="5761180" y="2880194"/>
             <a:ext cx="705834" cy="369332"/>
           </a:xfrm>
           <a:prstGeom prst="rect">
@@ -17408,7 +17408,7 @@
         </p:nvSpPr>
         <p:spPr>
           <a:xfrm>
-            <a:off x="4149056" y="4005452"/>
+            <a:off x="4200426" y="2885572"/>
             <a:ext cx="705834" cy="369332"/>
           </a:xfrm>
           <a:prstGeom prst="rect">
@@ -17443,7 +17443,7 @@
         </p:nvSpPr>
         <p:spPr>
           <a:xfrm>
-            <a:off x="7246358" y="4005452"/>
+            <a:off x="7318276" y="2885572"/>
             <a:ext cx="705834" cy="369332"/>
           </a:xfrm>
           <a:prstGeom prst="rect">
@@ -17478,7 +17478,7 @@
         </p:nvSpPr>
         <p:spPr>
           <a:xfrm>
-            <a:off x="5709810" y="5152935"/>
+            <a:off x="5761180" y="4033055"/>
             <a:ext cx="705834" cy="369332"/>
           </a:xfrm>
           <a:prstGeom prst="rect">
@@ -17513,7 +17513,7 @@
         </p:nvSpPr>
         <p:spPr>
           <a:xfrm>
-            <a:off x="4149056" y="5158313"/>
+            <a:off x="4200426" y="4038433"/>
             <a:ext cx="705834" cy="369332"/>
           </a:xfrm>
           <a:prstGeom prst="rect">
@@ -17548,7 +17548,7 @@
         </p:nvSpPr>
         <p:spPr>
           <a:xfrm>
-            <a:off x="7246358" y="5158313"/>
+            <a:off x="7318276" y="4038433"/>
             <a:ext cx="705834" cy="369332"/>
           </a:xfrm>
           <a:prstGeom prst="rect">
@@ -17583,7 +17583,7 @@
         </p:nvCxnSpPr>
         <p:spPr>
           <a:xfrm>
-            <a:off x="4293705" y="1614566"/>
+            <a:off x="4293705" y="494686"/>
             <a:ext cx="0" cy="4771015"/>
           </a:xfrm>
           <a:prstGeom prst="line">
@@ -17624,7 +17624,7 @@
         </p:nvCxnSpPr>
         <p:spPr>
           <a:xfrm>
-            <a:off x="4803913" y="1597512"/>
+            <a:off x="4803913" y="477632"/>
             <a:ext cx="0" cy="4771015"/>
           </a:xfrm>
           <a:prstGeom prst="line">
@@ -17665,7 +17665,7 @@
         </p:nvCxnSpPr>
         <p:spPr>
           <a:xfrm>
-            <a:off x="5857462" y="1608845"/>
+            <a:off x="5857462" y="488965"/>
             <a:ext cx="0" cy="4771015"/>
           </a:xfrm>
           <a:prstGeom prst="line">
@@ -17706,7 +17706,7 @@
         </p:nvCxnSpPr>
         <p:spPr>
           <a:xfrm>
-            <a:off x="6367670" y="1591791"/>
+            <a:off x="6367670" y="471911"/>
             <a:ext cx="0" cy="4771015"/>
           </a:xfrm>
           <a:prstGeom prst="line">
@@ -17747,7 +17747,7 @@
         </p:nvCxnSpPr>
         <p:spPr>
           <a:xfrm>
-            <a:off x="7411279" y="1619943"/>
+            <a:off x="7411279" y="500063"/>
             <a:ext cx="0" cy="4771015"/>
           </a:xfrm>
           <a:prstGeom prst="line">
@@ -17788,7 +17788,7 @@
         </p:nvCxnSpPr>
         <p:spPr>
           <a:xfrm>
-            <a:off x="7921487" y="1602889"/>
+            <a:off x="7921487" y="483009"/>
             <a:ext cx="0" cy="4771015"/>
           </a:xfrm>
           <a:prstGeom prst="line">
@@ -17829,7 +17829,7 @@
         </p:nvSpPr>
         <p:spPr>
           <a:xfrm>
-            <a:off x="2521928" y="2047462"/>
+            <a:off x="2521928" y="927582"/>
             <a:ext cx="996555" cy="369332"/>
           </a:xfrm>
           <a:prstGeom prst="rect">
@@ -17864,7 +17864,7 @@
         </p:nvSpPr>
         <p:spPr>
           <a:xfrm>
-            <a:off x="2521927" y="3244334"/>
+            <a:off x="2521927" y="2124454"/>
             <a:ext cx="996555" cy="369332"/>
           </a:xfrm>
           <a:prstGeom prst="rect">
@@ -17899,7 +17899,7 @@
         </p:nvSpPr>
         <p:spPr>
           <a:xfrm>
-            <a:off x="2521926" y="4441206"/>
+            <a:off x="2521926" y="3321326"/>
             <a:ext cx="996555" cy="369332"/>
           </a:xfrm>
           <a:prstGeom prst="rect">
@@ -17934,7 +17934,7 @@
         </p:nvSpPr>
         <p:spPr>
           <a:xfrm>
-            <a:off x="2521926" y="5638078"/>
+            <a:off x="2521926" y="4518198"/>
             <a:ext cx="996555" cy="369332"/>
           </a:xfrm>
           <a:prstGeom prst="rect">
@@ -17999,7 +17999,7 @@
         </p:nvSpPr>
         <p:spPr>
           <a:xfrm>
-            <a:off x="3808209" y="1602889"/>
+            <a:off x="3808209" y="349445"/>
             <a:ext cx="4582757" cy="4765638"/>
           </a:xfrm>
           <a:prstGeom prst="rect">
@@ -18055,7 +18055,7 @@
         </p:nvCxnSpPr>
         <p:spPr>
           <a:xfrm>
-            <a:off x="3808209" y="3985708"/>
+            <a:off x="3808209" y="2732264"/>
             <a:ext cx="4582757" cy="0"/>
           </a:xfrm>
           <a:prstGeom prst="line">
@@ -18098,7 +18098,7 @@
         </p:nvCxnSpPr>
         <p:spPr>
           <a:xfrm>
-            <a:off x="3808209" y="5138570"/>
+            <a:off x="3808209" y="3885126"/>
             <a:ext cx="4582757" cy="0"/>
           </a:xfrm>
           <a:prstGeom prst="line">
@@ -18141,7 +18141,7 @@
         </p:nvCxnSpPr>
         <p:spPr>
           <a:xfrm>
-            <a:off x="3804621" y="2827468"/>
+            <a:off x="3804621" y="1574024"/>
             <a:ext cx="4582757" cy="0"/>
           </a:xfrm>
           <a:prstGeom prst="line">
@@ -18182,7 +18182,7 @@
         </p:nvCxnSpPr>
         <p:spPr>
           <a:xfrm>
-            <a:off x="5314281" y="1602889"/>
+            <a:off x="5314281" y="349445"/>
             <a:ext cx="0" cy="4765638"/>
           </a:xfrm>
           <a:prstGeom prst="line">
@@ -18223,7 +18223,7 @@
         </p:nvCxnSpPr>
         <p:spPr>
           <a:xfrm>
-            <a:off x="6929716" y="1602889"/>
+            <a:off x="6929716" y="349445"/>
             <a:ext cx="0" cy="4765638"/>
           </a:xfrm>
           <a:prstGeom prst="line">
@@ -18264,7 +18264,7 @@
         </p:nvSpPr>
         <p:spPr>
           <a:xfrm>
-            <a:off x="5759238" y="1688973"/>
+            <a:off x="5759238" y="435529"/>
             <a:ext cx="705834" cy="369332"/>
           </a:xfrm>
           <a:prstGeom prst="rect">
@@ -18299,7 +18299,7 @@
         </p:nvSpPr>
         <p:spPr>
           <a:xfrm>
-            <a:off x="4198484" y="1694351"/>
+            <a:off x="4198484" y="440907"/>
             <a:ext cx="705834" cy="369332"/>
           </a:xfrm>
           <a:prstGeom prst="rect">
@@ -18334,7 +18334,7 @@
         </p:nvSpPr>
         <p:spPr>
           <a:xfrm>
-            <a:off x="7295786" y="1694351"/>
+            <a:off x="7295786" y="440907"/>
             <a:ext cx="705834" cy="369332"/>
           </a:xfrm>
           <a:prstGeom prst="rect">
@@ -18369,7 +18369,7 @@
         </p:nvSpPr>
         <p:spPr>
           <a:xfrm>
-            <a:off x="5759238" y="2827468"/>
+            <a:off x="5759238" y="1574024"/>
             <a:ext cx="705834" cy="369332"/>
           </a:xfrm>
           <a:prstGeom prst="rect">
@@ -18404,7 +18404,7 @@
         </p:nvSpPr>
         <p:spPr>
           <a:xfrm>
-            <a:off x="4198484" y="2832846"/>
+            <a:off x="4198484" y="1579402"/>
             <a:ext cx="705834" cy="369332"/>
           </a:xfrm>
           <a:prstGeom prst="rect">
@@ -18439,7 +18439,7 @@
         </p:nvSpPr>
         <p:spPr>
           <a:xfrm>
-            <a:off x="7295786" y="2832846"/>
+            <a:off x="7295786" y="1579402"/>
             <a:ext cx="705834" cy="369332"/>
           </a:xfrm>
           <a:prstGeom prst="rect">
@@ -18474,7 +18474,7 @@
         </p:nvSpPr>
         <p:spPr>
           <a:xfrm>
-            <a:off x="5759238" y="4000074"/>
+            <a:off x="5759238" y="2746630"/>
             <a:ext cx="705834" cy="369332"/>
           </a:xfrm>
           <a:prstGeom prst="rect">
@@ -18509,7 +18509,7 @@
         </p:nvSpPr>
         <p:spPr>
           <a:xfrm>
-            <a:off x="4198484" y="4005452"/>
+            <a:off x="4198484" y="2752008"/>
             <a:ext cx="705834" cy="369332"/>
           </a:xfrm>
           <a:prstGeom prst="rect">
@@ -18544,7 +18544,7 @@
         </p:nvSpPr>
         <p:spPr>
           <a:xfrm>
-            <a:off x="7295786" y="4005452"/>
+            <a:off x="7295786" y="2752008"/>
             <a:ext cx="705834" cy="369332"/>
           </a:xfrm>
           <a:prstGeom prst="rect">
@@ -18579,7 +18579,7 @@
         </p:nvSpPr>
         <p:spPr>
           <a:xfrm>
-            <a:off x="5759238" y="5152935"/>
+            <a:off x="5759238" y="3899491"/>
             <a:ext cx="705834" cy="369332"/>
           </a:xfrm>
           <a:prstGeom prst="rect">
@@ -18614,7 +18614,7 @@
         </p:nvSpPr>
         <p:spPr>
           <a:xfrm>
-            <a:off x="4198484" y="5158313"/>
+            <a:off x="4198484" y="3904869"/>
             <a:ext cx="705834" cy="369332"/>
           </a:xfrm>
           <a:prstGeom prst="rect">
@@ -18649,7 +18649,7 @@
         </p:nvSpPr>
         <p:spPr>
           <a:xfrm>
-            <a:off x="7295786" y="5158313"/>
+            <a:off x="7295786" y="3904869"/>
             <a:ext cx="705834" cy="369332"/>
           </a:xfrm>
           <a:prstGeom prst="rect">
@@ -18684,7 +18684,7 @@
         </p:nvCxnSpPr>
         <p:spPr>
           <a:xfrm>
-            <a:off x="4293705" y="1614566"/>
+            <a:off x="4293705" y="361122"/>
             <a:ext cx="0" cy="4771015"/>
           </a:xfrm>
           <a:prstGeom prst="line">
@@ -18725,7 +18725,7 @@
         </p:nvCxnSpPr>
         <p:spPr>
           <a:xfrm>
-            <a:off x="4803913" y="1597512"/>
+            <a:off x="4803913" y="344068"/>
             <a:ext cx="0" cy="4771015"/>
           </a:xfrm>
           <a:prstGeom prst="line">
@@ -18766,7 +18766,7 @@
         </p:nvCxnSpPr>
         <p:spPr>
           <a:xfrm>
-            <a:off x="5857462" y="1608845"/>
+            <a:off x="5857462" y="355401"/>
             <a:ext cx="0" cy="4771015"/>
           </a:xfrm>
           <a:prstGeom prst="line">
@@ -18807,7 +18807,7 @@
         </p:nvCxnSpPr>
         <p:spPr>
           <a:xfrm>
-            <a:off x="6367670" y="1591791"/>
+            <a:off x="6367670" y="338347"/>
             <a:ext cx="0" cy="4771015"/>
           </a:xfrm>
           <a:prstGeom prst="line">
@@ -18848,7 +18848,7 @@
         </p:nvCxnSpPr>
         <p:spPr>
           <a:xfrm>
-            <a:off x="7411279" y="1619943"/>
+            <a:off x="7411279" y="366499"/>
             <a:ext cx="0" cy="4771015"/>
           </a:xfrm>
           <a:prstGeom prst="line">
@@ -18889,7 +18889,7 @@
         </p:nvCxnSpPr>
         <p:spPr>
           <a:xfrm>
-            <a:off x="7921487" y="1602889"/>
+            <a:off x="7921487" y="349445"/>
             <a:ext cx="0" cy="4771015"/>
           </a:xfrm>
           <a:prstGeom prst="line">
@@ -18930,7 +18930,7 @@
         </p:nvSpPr>
         <p:spPr>
           <a:xfrm>
-            <a:off x="3801095" y="2486226"/>
+            <a:off x="3801095" y="1232782"/>
             <a:ext cx="293670" cy="338554"/>
           </a:xfrm>
           <a:prstGeom prst="rect">
@@ -18965,7 +18965,7 @@
         </p:nvSpPr>
         <p:spPr>
           <a:xfrm>
-            <a:off x="4273735" y="2488914"/>
+            <a:off x="4273735" y="1235470"/>
             <a:ext cx="303288" cy="338554"/>
           </a:xfrm>
           <a:prstGeom prst="rect">
@@ -19000,7 +19000,7 @@
         </p:nvSpPr>
         <p:spPr>
           <a:xfrm>
-            <a:off x="4773902" y="2491603"/>
+            <a:off x="4773902" y="1238159"/>
             <a:ext cx="296876" cy="338554"/>
           </a:xfrm>
           <a:prstGeom prst="rect">
@@ -19035,7 +19035,7 @@
         </p:nvSpPr>
         <p:spPr>
           <a:xfrm>
-            <a:off x="5348288" y="2499726"/>
+            <a:off x="5348288" y="1246282"/>
             <a:ext cx="303288" cy="338554"/>
           </a:xfrm>
           <a:prstGeom prst="rect">
@@ -19070,7 +19070,7 @@
         </p:nvSpPr>
         <p:spPr>
           <a:xfrm>
-            <a:off x="5820928" y="2502414"/>
+            <a:off x="5820928" y="1248970"/>
             <a:ext cx="296876" cy="338554"/>
           </a:xfrm>
           <a:prstGeom prst="rect">
@@ -19105,7 +19105,7 @@
         </p:nvSpPr>
         <p:spPr>
           <a:xfrm>
-            <a:off x="6350912" y="2505103"/>
+            <a:off x="6350912" y="1251659"/>
             <a:ext cx="293670" cy="338554"/>
           </a:xfrm>
           <a:prstGeom prst="rect">
@@ -19140,7 +19140,7 @@
         </p:nvSpPr>
         <p:spPr>
           <a:xfrm>
-            <a:off x="6893607" y="2498792"/>
+            <a:off x="6893607" y="1245348"/>
             <a:ext cx="293670" cy="338554"/>
           </a:xfrm>
           <a:prstGeom prst="rect">
@@ -19175,7 +19175,7 @@
         </p:nvSpPr>
         <p:spPr>
           <a:xfrm>
-            <a:off x="7366247" y="2501480"/>
+            <a:off x="7366247" y="1248036"/>
             <a:ext cx="296876" cy="338554"/>
           </a:xfrm>
           <a:prstGeom prst="rect">
@@ -19210,7 +19210,7 @@
         </p:nvSpPr>
         <p:spPr>
           <a:xfrm>
-            <a:off x="7866414" y="2504169"/>
+            <a:off x="7866414" y="1250725"/>
             <a:ext cx="303288" cy="338554"/>
           </a:xfrm>
           <a:prstGeom prst="rect">
@@ -19245,7 +19245,7 @@
         </p:nvSpPr>
         <p:spPr>
           <a:xfrm>
-            <a:off x="3801095" y="3644626"/>
+            <a:off x="3801095" y="2391182"/>
             <a:ext cx="303288" cy="338554"/>
           </a:xfrm>
           <a:prstGeom prst="rect">
@@ -19280,7 +19280,7 @@
         </p:nvSpPr>
         <p:spPr>
           <a:xfrm>
-            <a:off x="4273735" y="3647314"/>
+            <a:off x="4273735" y="2393870"/>
             <a:ext cx="293670" cy="338554"/>
           </a:xfrm>
           <a:prstGeom prst="rect">
@@ -19315,7 +19315,7 @@
         </p:nvSpPr>
         <p:spPr>
           <a:xfrm>
-            <a:off x="4773902" y="3650003"/>
+            <a:off x="4773902" y="2396559"/>
             <a:ext cx="296876" cy="338554"/>
           </a:xfrm>
           <a:prstGeom prst="rect">
@@ -19350,7 +19350,7 @@
         </p:nvSpPr>
         <p:spPr>
           <a:xfrm>
-            <a:off x="5348288" y="3658126"/>
+            <a:off x="5348288" y="2404682"/>
             <a:ext cx="293670" cy="338554"/>
           </a:xfrm>
           <a:prstGeom prst="rect">
@@ -19385,7 +19385,7 @@
         </p:nvSpPr>
         <p:spPr>
           <a:xfrm>
-            <a:off x="5820928" y="3660814"/>
+            <a:off x="5820928" y="2407370"/>
             <a:ext cx="303288" cy="338554"/>
           </a:xfrm>
           <a:prstGeom prst="rect">
@@ -19420,7 +19420,7 @@
         </p:nvSpPr>
         <p:spPr>
           <a:xfrm>
-            <a:off x="6350912" y="3663503"/>
+            <a:off x="6350912" y="2410059"/>
             <a:ext cx="296876" cy="338554"/>
           </a:xfrm>
           <a:prstGeom prst="rect">
@@ -19455,7 +19455,7 @@
         </p:nvSpPr>
         <p:spPr>
           <a:xfrm>
-            <a:off x="6893607" y="3657192"/>
+            <a:off x="6893607" y="2403748"/>
             <a:ext cx="296876" cy="338554"/>
           </a:xfrm>
           <a:prstGeom prst="rect">
@@ -19490,7 +19490,7 @@
         </p:nvSpPr>
         <p:spPr>
           <a:xfrm>
-            <a:off x="7366247" y="3659880"/>
+            <a:off x="7366247" y="2406436"/>
             <a:ext cx="293670" cy="338554"/>
           </a:xfrm>
           <a:prstGeom prst="rect">
@@ -19525,7 +19525,7 @@
         </p:nvSpPr>
         <p:spPr>
           <a:xfrm>
-            <a:off x="7866414" y="3662569"/>
+            <a:off x="7866414" y="2409125"/>
             <a:ext cx="303288" cy="338554"/>
           </a:xfrm>
           <a:prstGeom prst="rect">
@@ -19560,7 +19560,7 @@
         </p:nvSpPr>
         <p:spPr>
           <a:xfrm>
-            <a:off x="3801095" y="4780318"/>
+            <a:off x="3801095" y="3526874"/>
             <a:ext cx="296876" cy="338554"/>
           </a:xfrm>
           <a:prstGeom prst="rect">
@@ -19595,7 +19595,7 @@
         </p:nvSpPr>
         <p:spPr>
           <a:xfrm>
-            <a:off x="4273735" y="4783006"/>
+            <a:off x="4273735" y="3529562"/>
             <a:ext cx="293670" cy="338554"/>
           </a:xfrm>
           <a:prstGeom prst="rect">
@@ -19630,7 +19630,7 @@
         </p:nvSpPr>
         <p:spPr>
           <a:xfrm>
-            <a:off x="4773902" y="4785695"/>
+            <a:off x="4773902" y="3532251"/>
             <a:ext cx="303288" cy="338554"/>
           </a:xfrm>
           <a:prstGeom prst="rect">
@@ -19665,7 +19665,7 @@
         </p:nvSpPr>
         <p:spPr>
           <a:xfrm>
-            <a:off x="5348288" y="4793818"/>
+            <a:off x="5348288" y="3540374"/>
             <a:ext cx="303288" cy="338554"/>
           </a:xfrm>
           <a:prstGeom prst="rect">
@@ -19700,7 +19700,7 @@
         </p:nvSpPr>
         <p:spPr>
           <a:xfrm>
-            <a:off x="5820928" y="4796506"/>
+            <a:off x="5820928" y="3543062"/>
             <a:ext cx="296876" cy="338554"/>
           </a:xfrm>
           <a:prstGeom prst="rect">
@@ -19735,7 +19735,7 @@
         </p:nvSpPr>
         <p:spPr>
           <a:xfrm>
-            <a:off x="6350912" y="4799195"/>
+            <a:off x="6350912" y="3545751"/>
             <a:ext cx="293670" cy="338554"/>
           </a:xfrm>
           <a:prstGeom prst="rect">
@@ -19770,7 +19770,7 @@
         </p:nvSpPr>
         <p:spPr>
           <a:xfrm>
-            <a:off x="6893607" y="4792884"/>
+            <a:off x="6893607" y="3539440"/>
             <a:ext cx="296876" cy="338554"/>
           </a:xfrm>
           <a:prstGeom prst="rect">
@@ -19805,7 +19805,7 @@
         </p:nvSpPr>
         <p:spPr>
           <a:xfrm>
-            <a:off x="7366247" y="4795572"/>
+            <a:off x="7366247" y="3542128"/>
             <a:ext cx="293670" cy="338554"/>
           </a:xfrm>
           <a:prstGeom prst="rect">
@@ -19840,7 +19840,7 @@
         </p:nvSpPr>
         <p:spPr>
           <a:xfrm>
-            <a:off x="7866414" y="4798261"/>
+            <a:off x="7866414" y="3544817"/>
             <a:ext cx="303288" cy="338554"/>
           </a:xfrm>
           <a:prstGeom prst="rect">
@@ -19875,7 +19875,7 @@
         </p:nvSpPr>
         <p:spPr>
           <a:xfrm>
-            <a:off x="3807282" y="5996871"/>
+            <a:off x="3807282" y="4743427"/>
             <a:ext cx="303288" cy="338554"/>
           </a:xfrm>
           <a:prstGeom prst="rect">
@@ -19910,7 +19910,7 @@
         </p:nvSpPr>
         <p:spPr>
           <a:xfrm>
-            <a:off x="4279922" y="5999559"/>
+            <a:off x="4279922" y="4746115"/>
             <a:ext cx="293670" cy="338554"/>
           </a:xfrm>
           <a:prstGeom prst="rect">
@@ -19945,7 +19945,7 @@
         </p:nvSpPr>
         <p:spPr>
           <a:xfrm>
-            <a:off x="4780089" y="6002248"/>
+            <a:off x="4780089" y="4748804"/>
             <a:ext cx="296876" cy="338554"/>
           </a:xfrm>
           <a:prstGeom prst="rect">
@@ -19980,7 +19980,7 @@
         </p:nvSpPr>
         <p:spPr>
           <a:xfrm>
-            <a:off x="5354475" y="6010371"/>
+            <a:off x="5354475" y="4756927"/>
             <a:ext cx="303288" cy="338554"/>
           </a:xfrm>
           <a:prstGeom prst="rect">
@@ -20015,7 +20015,7 @@
         </p:nvSpPr>
         <p:spPr>
           <a:xfrm>
-            <a:off x="5827115" y="6013059"/>
+            <a:off x="5827115" y="4759615"/>
             <a:ext cx="296876" cy="338554"/>
           </a:xfrm>
           <a:prstGeom prst="rect">
@@ -20050,7 +20050,7 @@
         </p:nvSpPr>
         <p:spPr>
           <a:xfrm>
-            <a:off x="6357099" y="6015748"/>
+            <a:off x="6357099" y="4762304"/>
             <a:ext cx="293670" cy="338554"/>
           </a:xfrm>
           <a:prstGeom prst="rect">
@@ -20085,7 +20085,7 @@
         </p:nvSpPr>
         <p:spPr>
           <a:xfrm>
-            <a:off x="6899794" y="6009437"/>
+            <a:off x="6899794" y="4755993"/>
             <a:ext cx="293670" cy="338554"/>
           </a:xfrm>
           <a:prstGeom prst="rect">
@@ -20120,7 +20120,7 @@
         </p:nvSpPr>
         <p:spPr>
           <a:xfrm>
-            <a:off x="7372434" y="6012125"/>
+            <a:off x="7372434" y="4758681"/>
             <a:ext cx="303288" cy="338554"/>
           </a:xfrm>
           <a:prstGeom prst="rect">
@@ -20155,7 +20155,7 @@
         </p:nvSpPr>
         <p:spPr>
           <a:xfrm>
-            <a:off x="7872601" y="6014814"/>
+            <a:off x="7872601" y="4761370"/>
             <a:ext cx="296876" cy="338554"/>
           </a:xfrm>
           <a:prstGeom prst="rect">
@@ -20190,7 +20190,7 @@
         </p:nvSpPr>
         <p:spPr>
           <a:xfrm>
-            <a:off x="2521928" y="2047462"/>
+            <a:off x="2521928" y="794018"/>
             <a:ext cx="996555" cy="369332"/>
           </a:xfrm>
           <a:prstGeom prst="rect">
@@ -20225,7 +20225,7 @@
         </p:nvSpPr>
         <p:spPr>
           <a:xfrm>
-            <a:off x="2521927" y="3244334"/>
+            <a:off x="2521927" y="1990890"/>
             <a:ext cx="996555" cy="369332"/>
           </a:xfrm>
           <a:prstGeom prst="rect">
@@ -20260,7 +20260,7 @@
         </p:nvSpPr>
         <p:spPr>
           <a:xfrm>
-            <a:off x="2521926" y="4441206"/>
+            <a:off x="2521926" y="3187762"/>
             <a:ext cx="996555" cy="369332"/>
           </a:xfrm>
           <a:prstGeom prst="rect">
@@ -20295,7 +20295,7 @@
         </p:nvSpPr>
         <p:spPr>
           <a:xfrm>
-            <a:off x="2521926" y="5638078"/>
+            <a:off x="2521926" y="4384634"/>
             <a:ext cx="996555" cy="369332"/>
           </a:xfrm>
           <a:prstGeom prst="rect">

</xml_diff>